<commit_message>
Updated presentation as per Morgan comments
</commit_message>
<xml_diff>
--- a/Machine-Predictive-Maintenance.pptx
+++ b/Machine-Predictive-Maintenance.pptx
@@ -823,7 +823,7 @@
   <p:cSld>
     <p:spTree>
       <p:nvGrpSpPr>
-        <p:cNvPr id="120" name="Shape 120"/>
+        <p:cNvPr id="123" name="Shape 123"/>
         <p:cNvGrpSpPr/>
         <p:nvPr/>
       </p:nvGrpSpPr>
@@ -837,7 +837,7 @@
       </p:grpSpPr>
       <p:sp>
         <p:nvSpPr>
-          <p:cNvPr id="121" name="Google Shape;121;g155ad78816a_0_0:notes"/>
+          <p:cNvPr id="124" name="Google Shape;124;g155ad78816a_0_0:notes"/>
           <p:cNvSpPr/>
           <p:nvPr>
             <p:ph idx="2" type="sldImg"/>
@@ -872,7 +872,7 @@
       </p:sp>
       <p:sp>
         <p:nvSpPr>
-          <p:cNvPr id="122" name="Google Shape;122;g155ad78816a_0_0:notes"/>
+          <p:cNvPr id="125" name="Google Shape;125;g155ad78816a_0_0:notes"/>
           <p:cNvSpPr txBox="1"/>
           <p:nvPr>
             <p:ph idx="1" type="body"/>
@@ -926,7 +926,7 @@
   <p:cSld>
     <p:spTree>
       <p:nvGrpSpPr>
-        <p:cNvPr id="126" name="Shape 126"/>
+        <p:cNvPr id="129" name="Shape 129"/>
         <p:cNvGrpSpPr/>
         <p:nvPr/>
       </p:nvGrpSpPr>
@@ -940,7 +940,7 @@
       </p:grpSpPr>
       <p:sp>
         <p:nvSpPr>
-          <p:cNvPr id="127" name="Google Shape;127;g1356b69a874_0_22:notes"/>
+          <p:cNvPr id="130" name="Google Shape;130;g1356b69a874_0_22:notes"/>
           <p:cNvSpPr/>
           <p:nvPr>
             <p:ph idx="2" type="sldImg"/>
@@ -975,7 +975,7 @@
       </p:sp>
       <p:sp>
         <p:nvSpPr>
-          <p:cNvPr id="128" name="Google Shape;128;g1356b69a874_0_22:notes"/>
+          <p:cNvPr id="131" name="Google Shape;131;g1356b69a874_0_22:notes"/>
           <p:cNvSpPr txBox="1"/>
           <p:nvPr>
             <p:ph idx="1" type="body"/>
@@ -1422,7 +1422,7 @@
   <p:cSld>
     <p:spTree>
       <p:nvGrpSpPr>
-        <p:cNvPr id="88" name="Shape 88"/>
+        <p:cNvPr id="89" name="Shape 89"/>
         <p:cNvGrpSpPr/>
         <p:nvPr/>
       </p:nvGrpSpPr>
@@ -1436,7 +1436,7 @@
       </p:grpSpPr>
       <p:sp>
         <p:nvSpPr>
-          <p:cNvPr id="89" name="Google Shape;89;g14b64674489_0_75:notes"/>
+          <p:cNvPr id="90" name="Google Shape;90;g14b64674489_0_75:notes"/>
           <p:cNvSpPr/>
           <p:nvPr>
             <p:ph idx="2" type="sldImg"/>
@@ -1471,7 +1471,7 @@
       </p:sp>
       <p:sp>
         <p:nvSpPr>
-          <p:cNvPr id="90" name="Google Shape;90;g14b64674489_0_75:notes"/>
+          <p:cNvPr id="91" name="Google Shape;91;g14b64674489_0_75:notes"/>
           <p:cNvSpPr txBox="1"/>
           <p:nvPr>
             <p:ph idx="1" type="body"/>
@@ -1521,7 +1521,7 @@
   <p:cSld>
     <p:spTree>
       <p:nvGrpSpPr>
-        <p:cNvPr id="97" name="Shape 97"/>
+        <p:cNvPr id="99" name="Shape 99"/>
         <p:cNvGrpSpPr/>
         <p:nvPr/>
       </p:nvGrpSpPr>
@@ -1535,7 +1535,7 @@
       </p:grpSpPr>
       <p:sp>
         <p:nvSpPr>
-          <p:cNvPr id="98" name="Google Shape;98;g179fbabe2ab_0_12:notes"/>
+          <p:cNvPr id="100" name="Google Shape;100;g179fbabe2ab_0_12:notes"/>
           <p:cNvSpPr/>
           <p:nvPr>
             <p:ph idx="2" type="sldImg"/>
@@ -1570,7 +1570,7 @@
       </p:sp>
       <p:sp>
         <p:nvSpPr>
-          <p:cNvPr id="99" name="Google Shape;99;g179fbabe2ab_0_12:notes"/>
+          <p:cNvPr id="101" name="Google Shape;101;g179fbabe2ab_0_12:notes"/>
           <p:cNvSpPr txBox="1"/>
           <p:nvPr>
             <p:ph idx="1" type="body"/>
@@ -1700,7 +1700,7 @@
   <p:cSld>
     <p:spTree>
       <p:nvGrpSpPr>
-        <p:cNvPr id="107" name="Shape 107"/>
+        <p:cNvPr id="109" name="Shape 109"/>
         <p:cNvGrpSpPr/>
         <p:nvPr/>
       </p:nvGrpSpPr>
@@ -1714,7 +1714,7 @@
       </p:grpSpPr>
       <p:sp>
         <p:nvSpPr>
-          <p:cNvPr id="108" name="Google Shape;108;g1558826cedc_0_0:notes"/>
+          <p:cNvPr id="110" name="Google Shape;110;g1558826cedc_0_0:notes"/>
           <p:cNvSpPr/>
           <p:nvPr>
             <p:ph idx="2" type="sldImg"/>
@@ -1749,7 +1749,7 @@
       </p:sp>
       <p:sp>
         <p:nvSpPr>
-          <p:cNvPr id="109" name="Google Shape;109;g1558826cedc_0_0:notes"/>
+          <p:cNvPr id="111" name="Google Shape;111;g1558826cedc_0_0:notes"/>
           <p:cNvSpPr txBox="1"/>
           <p:nvPr>
             <p:ph idx="1" type="body"/>
@@ -1799,7 +1799,7 @@
   <p:cSld>
     <p:spTree>
       <p:nvGrpSpPr>
-        <p:cNvPr id="113" name="Shape 113"/>
+        <p:cNvPr id="116" name="Shape 116"/>
         <p:cNvGrpSpPr/>
         <p:nvPr/>
       </p:nvGrpSpPr>
@@ -1813,7 +1813,7 @@
       </p:grpSpPr>
       <p:sp>
         <p:nvSpPr>
-          <p:cNvPr id="114" name="Google Shape;114;g1356b69a874_0_8:notes"/>
+          <p:cNvPr id="117" name="Google Shape;117;g1356b69a874_0_8:notes"/>
           <p:cNvSpPr/>
           <p:nvPr>
             <p:ph idx="2" type="sldImg"/>
@@ -1848,7 +1848,7 @@
       </p:sp>
       <p:sp>
         <p:nvSpPr>
-          <p:cNvPr id="115" name="Google Shape;115;g1356b69a874_0_8:notes"/>
+          <p:cNvPr id="118" name="Google Shape;118;g1356b69a874_0_8:notes"/>
           <p:cNvSpPr txBox="1"/>
           <p:nvPr>
             <p:ph idx="1" type="body"/>
@@ -7302,7 +7302,7 @@
   <p:cSld>
     <p:spTree>
       <p:nvGrpSpPr>
-        <p:cNvPr id="123" name="Shape 123"/>
+        <p:cNvPr id="126" name="Shape 126"/>
         <p:cNvGrpSpPr/>
         <p:nvPr/>
       </p:nvGrpSpPr>
@@ -7316,7 +7316,7 @@
       </p:grpSpPr>
       <p:sp>
         <p:nvSpPr>
-          <p:cNvPr id="124" name="Google Shape;124;p22"/>
+          <p:cNvPr id="127" name="Google Shape;127;p22"/>
           <p:cNvSpPr txBox="1"/>
           <p:nvPr>
             <p:ph type="title"/>
@@ -7356,7 +7356,7 @@
       </p:sp>
       <p:sp>
         <p:nvSpPr>
-          <p:cNvPr id="125" name="Google Shape;125;p22"/>
+          <p:cNvPr id="128" name="Google Shape;128;p22"/>
           <p:cNvSpPr txBox="1"/>
           <p:nvPr/>
         </p:nvSpPr>
@@ -7528,7 +7528,7 @@
   <p:cSld>
     <p:spTree>
       <p:nvGrpSpPr>
-        <p:cNvPr id="129" name="Shape 129"/>
+        <p:cNvPr id="132" name="Shape 132"/>
         <p:cNvGrpSpPr/>
         <p:nvPr/>
       </p:nvGrpSpPr>
@@ -7542,7 +7542,7 @@
       </p:grpSpPr>
       <p:sp>
         <p:nvSpPr>
-          <p:cNvPr id="130" name="Google Shape;130;p23"/>
+          <p:cNvPr id="133" name="Google Shape;133;p23"/>
           <p:cNvSpPr txBox="1"/>
           <p:nvPr>
             <p:ph type="title"/>
@@ -8176,7 +8176,7 @@
         </p:blipFill>
         <p:spPr>
           <a:xfrm>
-            <a:off x="1991763" y="639300"/>
+            <a:off x="163688" y="639300"/>
             <a:ext cx="4864466" cy="4199402"/>
           </a:xfrm>
           <a:prstGeom prst="rect">
@@ -8188,6 +8188,64 @@
           </a:ln>
         </p:spPr>
       </p:pic>
+      <p:sp>
+        <p:nvSpPr>
+          <p:cNvPr id="88" name="Google Shape;88;p17"/>
+          <p:cNvSpPr txBox="1"/>
+          <p:nvPr/>
+        </p:nvSpPr>
+        <p:spPr>
+          <a:xfrm>
+            <a:off x="5380325" y="2156100"/>
+            <a:ext cx="3596700" cy="831300"/>
+          </a:xfrm>
+          <a:prstGeom prst="rect">
+            <a:avLst/>
+          </a:prstGeom>
+          <a:noFill/>
+          <a:ln>
+            <a:noFill/>
+          </a:ln>
+        </p:spPr>
+        <p:txBody>
+          <a:bodyPr anchorCtr="0" anchor="t" bIns="91425" lIns="91425" spcFirstLastPara="1" rIns="91425" wrap="square" tIns="91425">
+            <a:spAutoFit/>
+          </a:bodyPr>
+          <a:lstStyle/>
+          <a:p>
+            <a:pPr indent="0" lvl="0" marL="0" rtl="0" algn="l">
+              <a:spcBef>
+                <a:spcPts val="0"/>
+              </a:spcBef>
+              <a:spcAft>
+                <a:spcPts val="0"/>
+              </a:spcAft>
+              <a:buNone/>
+            </a:pPr>
+            <a:r>
+              <a:rPr lang="en">
+                <a:solidFill>
+                  <a:schemeClr val="dk1"/>
+                </a:solidFill>
+                <a:latin typeface="Roboto"/>
+                <a:ea typeface="Roboto"/>
+                <a:cs typeface="Roboto"/>
+                <a:sym typeface="Roboto"/>
+              </a:rPr>
+              <a:t>Heat Dissipation, Power Failure, and Overstrain Failure are most common failures</a:t>
+            </a:r>
+            <a:endParaRPr>
+              <a:solidFill>
+                <a:schemeClr val="dk1"/>
+              </a:solidFill>
+              <a:latin typeface="Roboto"/>
+              <a:ea typeface="Roboto"/>
+              <a:cs typeface="Roboto"/>
+              <a:sym typeface="Roboto"/>
+            </a:endParaRPr>
+          </a:p>
+        </p:txBody>
+      </p:sp>
     </p:spTree>
   </p:cSld>
   <p:clrMapOvr>
@@ -8201,7 +8259,7 @@
   <p:cSld>
     <p:spTree>
       <p:nvGrpSpPr>
-        <p:cNvPr id="91" name="Shape 91"/>
+        <p:cNvPr id="92" name="Shape 92"/>
         <p:cNvGrpSpPr/>
         <p:nvPr/>
       </p:nvGrpSpPr>
@@ -8215,7 +8273,7 @@
       </p:grpSpPr>
       <p:sp>
         <p:nvSpPr>
-          <p:cNvPr id="92" name="Google Shape;92;p18"/>
+          <p:cNvPr id="93" name="Google Shape;93;p18"/>
           <p:cNvSpPr txBox="1"/>
           <p:nvPr>
             <p:ph type="title"/>
@@ -8255,7 +8313,7 @@
       </p:sp>
       <p:pic>
         <p:nvPicPr>
-          <p:cNvPr id="93" name="Google Shape;93;p18"/>
+          <p:cNvPr id="94" name="Google Shape;94;p18"/>
           <p:cNvPicPr preferRelativeResize="0"/>
           <p:nvPr/>
         </p:nvPicPr>
@@ -8282,7 +8340,7 @@
       </p:pic>
       <p:pic>
         <p:nvPicPr>
-          <p:cNvPr id="94" name="Google Shape;94;p18"/>
+          <p:cNvPr id="95" name="Google Shape;95;p18"/>
           <p:cNvPicPr preferRelativeResize="0"/>
           <p:nvPr/>
         </p:nvPicPr>
@@ -8309,7 +8367,7 @@
       </p:pic>
       <p:pic>
         <p:nvPicPr>
-          <p:cNvPr id="95" name="Google Shape;95;p18"/>
+          <p:cNvPr id="96" name="Google Shape;96;p18"/>
           <p:cNvPicPr preferRelativeResize="0"/>
           <p:nvPr/>
         </p:nvPicPr>
@@ -8336,7 +8394,7 @@
       </p:pic>
       <p:pic>
         <p:nvPicPr>
-          <p:cNvPr id="96" name="Google Shape;96;p18"/>
+          <p:cNvPr id="97" name="Google Shape;97;p18"/>
           <p:cNvPicPr preferRelativeResize="0"/>
           <p:nvPr/>
         </p:nvPicPr>
@@ -8361,6 +8419,64 @@
           </a:ln>
         </p:spPr>
       </p:pic>
+      <p:sp>
+        <p:nvSpPr>
+          <p:cNvPr id="98" name="Google Shape;98;p18"/>
+          <p:cNvSpPr txBox="1"/>
+          <p:nvPr/>
+        </p:nvSpPr>
+        <p:spPr>
+          <a:xfrm>
+            <a:off x="229425" y="2156100"/>
+            <a:ext cx="3596700" cy="831300"/>
+          </a:xfrm>
+          <a:prstGeom prst="rect">
+            <a:avLst/>
+          </a:prstGeom>
+          <a:noFill/>
+          <a:ln>
+            <a:noFill/>
+          </a:ln>
+        </p:spPr>
+        <p:txBody>
+          <a:bodyPr anchorCtr="0" anchor="t" bIns="91425" lIns="91425" spcFirstLastPara="1" rIns="91425" wrap="square" tIns="91425">
+            <a:spAutoFit/>
+          </a:bodyPr>
+          <a:lstStyle/>
+          <a:p>
+            <a:pPr indent="0" lvl="0" marL="0" rtl="0" algn="l">
+              <a:spcBef>
+                <a:spcPts val="0"/>
+              </a:spcBef>
+              <a:spcAft>
+                <a:spcPts val="0"/>
+              </a:spcAft>
+              <a:buNone/>
+            </a:pPr>
+            <a:r>
+              <a:rPr lang="en">
+                <a:solidFill>
+                  <a:schemeClr val="dk1"/>
+                </a:solidFill>
+                <a:latin typeface="Roboto"/>
+                <a:ea typeface="Roboto"/>
+                <a:cs typeface="Roboto"/>
+                <a:sym typeface="Roboto"/>
+              </a:rPr>
+              <a:t>Grouping between features show correlation between type of recorded data and type of failure</a:t>
+            </a:r>
+            <a:endParaRPr>
+              <a:solidFill>
+                <a:schemeClr val="dk1"/>
+              </a:solidFill>
+              <a:latin typeface="Roboto"/>
+              <a:ea typeface="Roboto"/>
+              <a:cs typeface="Roboto"/>
+              <a:sym typeface="Roboto"/>
+            </a:endParaRPr>
+          </a:p>
+        </p:txBody>
+      </p:sp>
     </p:spTree>
   </p:cSld>
   <p:clrMapOvr>
@@ -8374,7 +8490,7 @@
   <p:cSld>
     <p:spTree>
       <p:nvGrpSpPr>
-        <p:cNvPr id="100" name="Shape 100"/>
+        <p:cNvPr id="102" name="Shape 102"/>
         <p:cNvGrpSpPr/>
         <p:nvPr/>
       </p:nvGrpSpPr>
@@ -8388,7 +8504,7 @@
       </p:grpSpPr>
       <p:sp>
         <p:nvSpPr>
-          <p:cNvPr id="101" name="Google Shape;101;p19"/>
+          <p:cNvPr id="103" name="Google Shape;103;p19"/>
           <p:cNvSpPr txBox="1"/>
           <p:nvPr>
             <p:ph type="title"/>
@@ -8428,7 +8544,7 @@
       </p:sp>
       <p:pic>
         <p:nvPicPr>
-          <p:cNvPr id="102" name="Google Shape;102;p19"/>
+          <p:cNvPr id="104" name="Google Shape;104;p19"/>
           <p:cNvPicPr preferRelativeResize="0"/>
           <p:nvPr/>
         </p:nvPicPr>
@@ -8455,7 +8571,7 @@
       </p:pic>
       <p:pic>
         <p:nvPicPr>
-          <p:cNvPr id="103" name="Google Shape;103;p19"/>
+          <p:cNvPr id="105" name="Google Shape;105;p19"/>
           <p:cNvPicPr preferRelativeResize="0"/>
           <p:nvPr/>
         </p:nvPicPr>
@@ -8482,7 +8598,7 @@
       </p:pic>
       <p:pic>
         <p:nvPicPr>
-          <p:cNvPr id="104" name="Google Shape;104;p19"/>
+          <p:cNvPr id="106" name="Google Shape;106;p19"/>
           <p:cNvPicPr preferRelativeResize="0"/>
           <p:nvPr/>
         </p:nvPicPr>
@@ -8509,7 +8625,7 @@
       </p:pic>
       <p:pic>
         <p:nvPicPr>
-          <p:cNvPr id="105" name="Google Shape;105;p19"/>
+          <p:cNvPr id="107" name="Google Shape;107;p19"/>
           <p:cNvPicPr preferRelativeResize="0"/>
           <p:nvPr/>
         </p:nvPicPr>
@@ -8536,7 +8652,7 @@
       </p:pic>
       <p:pic>
         <p:nvPicPr>
-          <p:cNvPr id="106" name="Google Shape;106;p19"/>
+          <p:cNvPr id="108" name="Google Shape;108;p19"/>
           <p:cNvPicPr preferRelativeResize="0"/>
           <p:nvPr/>
         </p:nvPicPr>
@@ -8575,7 +8691,7 @@
   <p:cSld>
     <p:spTree>
       <p:nvGrpSpPr>
-        <p:cNvPr id="110" name="Shape 110"/>
+        <p:cNvPr id="112" name="Shape 112"/>
         <p:cNvGrpSpPr/>
         <p:nvPr/>
       </p:nvGrpSpPr>
@@ -8589,7 +8705,7 @@
       </p:grpSpPr>
       <p:sp>
         <p:nvSpPr>
-          <p:cNvPr id="111" name="Google Shape;111;p20"/>
+          <p:cNvPr id="113" name="Google Shape;113;p20"/>
           <p:cNvSpPr txBox="1"/>
           <p:nvPr>
             <p:ph type="title"/>
@@ -8629,7 +8745,7 @@
       </p:sp>
       <p:pic>
         <p:nvPicPr>
-          <p:cNvPr id="112" name="Google Shape;112;p20"/>
+          <p:cNvPr id="114" name="Google Shape;114;p20"/>
           <p:cNvPicPr preferRelativeResize="0"/>
           <p:nvPr/>
         </p:nvPicPr>
@@ -8643,7 +8759,7 @@
         </p:blipFill>
         <p:spPr>
           <a:xfrm>
-            <a:off x="1587375" y="769825"/>
+            <a:off x="107250" y="769825"/>
             <a:ext cx="5969239" cy="4068876"/>
           </a:xfrm>
           <a:prstGeom prst="rect">
@@ -8655,6 +8771,64 @@
           </a:ln>
         </p:spPr>
       </p:pic>
+      <p:sp>
+        <p:nvSpPr>
+          <p:cNvPr id="115" name="Google Shape;115;p20"/>
+          <p:cNvSpPr txBox="1"/>
+          <p:nvPr/>
+        </p:nvSpPr>
+        <p:spPr>
+          <a:xfrm>
+            <a:off x="6238800" y="1940700"/>
+            <a:ext cx="2708700" cy="1262100"/>
+          </a:xfrm>
+          <a:prstGeom prst="rect">
+            <a:avLst/>
+          </a:prstGeom>
+          <a:noFill/>
+          <a:ln>
+            <a:noFill/>
+          </a:ln>
+        </p:spPr>
+        <p:txBody>
+          <a:bodyPr anchorCtr="0" anchor="t" bIns="91425" lIns="91425" spcFirstLastPara="1" rIns="91425" wrap="square" tIns="91425">
+            <a:spAutoFit/>
+          </a:bodyPr>
+          <a:lstStyle/>
+          <a:p>
+            <a:pPr indent="0" lvl="0" marL="0" rtl="0" algn="l">
+              <a:spcBef>
+                <a:spcPts val="0"/>
+              </a:spcBef>
+              <a:spcAft>
+                <a:spcPts val="0"/>
+              </a:spcAft>
+              <a:buNone/>
+            </a:pPr>
+            <a:r>
+              <a:rPr lang="en">
+                <a:solidFill>
+                  <a:schemeClr val="dk1"/>
+                </a:solidFill>
+                <a:latin typeface="Roboto"/>
+                <a:ea typeface="Roboto"/>
+                <a:cs typeface="Roboto"/>
+                <a:sym typeface="Roboto"/>
+              </a:rPr>
+              <a:t>Final Model predicted all values correctly except for 2 instances of power failure and 1 instance of tool wear failure as Overstrain failure</a:t>
+            </a:r>
+            <a:endParaRPr>
+              <a:solidFill>
+                <a:schemeClr val="dk1"/>
+              </a:solidFill>
+              <a:latin typeface="Roboto"/>
+              <a:ea typeface="Roboto"/>
+              <a:cs typeface="Roboto"/>
+              <a:sym typeface="Roboto"/>
+            </a:endParaRPr>
+          </a:p>
+        </p:txBody>
+      </p:sp>
     </p:spTree>
   </p:cSld>
   <p:clrMapOvr>
@@ -8668,7 +8842,7 @@
   <p:cSld>
     <p:spTree>
       <p:nvGrpSpPr>
-        <p:cNvPr id="116" name="Shape 116"/>
+        <p:cNvPr id="119" name="Shape 119"/>
         <p:cNvGrpSpPr/>
         <p:nvPr/>
       </p:nvGrpSpPr>
@@ -8682,7 +8856,7 @@
       </p:grpSpPr>
       <p:sp>
         <p:nvSpPr>
-          <p:cNvPr id="117" name="Google Shape;117;p21"/>
+          <p:cNvPr id="120" name="Google Shape;120;p21"/>
           <p:cNvSpPr txBox="1"/>
           <p:nvPr>
             <p:ph type="title"/>
@@ -8722,7 +8896,7 @@
       </p:sp>
       <p:sp>
         <p:nvSpPr>
-          <p:cNvPr id="118" name="Google Shape;118;p21"/>
+          <p:cNvPr id="121" name="Google Shape;121;p21"/>
           <p:cNvSpPr txBox="1"/>
           <p:nvPr/>
         </p:nvSpPr>
@@ -8772,7 +8946,7 @@
       </p:sp>
       <p:sp>
         <p:nvSpPr>
-          <p:cNvPr id="119" name="Google Shape;119;p21"/>
+          <p:cNvPr id="122" name="Google Shape;122;p21"/>
           <p:cNvSpPr txBox="1"/>
           <p:nvPr/>
         </p:nvSpPr>
@@ -8829,6 +9003,285 @@
 </file>
 
 <file path=ppt/theme/theme1.xml><?xml version="1.0" encoding="utf-8"?>
+<a:theme xmlns:a="http://schemas.openxmlformats.org/drawingml/2006/main" xmlns:r="http://schemas.openxmlformats.org/officeDocument/2006/relationships" name="Slate">
+  <a:themeElements>
+    <a:clrScheme name="Slate">
+      <a:dk1>
+        <a:srgbClr val="FFFFFF"/>
+      </a:dk1>
+      <a:lt1>
+        <a:srgbClr val="37474F"/>
+      </a:lt1>
+      <a:dk2>
+        <a:srgbClr val="9E9E9E"/>
+      </a:dk2>
+      <a:lt2>
+        <a:srgbClr val="E0E0E0"/>
+      </a:lt2>
+      <a:accent1>
+        <a:srgbClr val="616161"/>
+      </a:accent1>
+      <a:accent2>
+        <a:srgbClr val="78909C"/>
+      </a:accent2>
+      <a:accent3>
+        <a:srgbClr val="CACACA"/>
+      </a:accent3>
+      <a:accent4>
+        <a:srgbClr val="64FFDA"/>
+      </a:accent4>
+      <a:accent5>
+        <a:srgbClr val="FFD966"/>
+      </a:accent5>
+      <a:accent6>
+        <a:srgbClr val="F5F5F5"/>
+      </a:accent6>
+      <a:hlink>
+        <a:srgbClr val="FFD966"/>
+      </a:hlink>
+      <a:folHlink>
+        <a:srgbClr val="FFD966"/>
+      </a:folHlink>
+    </a:clrScheme>
+    <a:fontScheme name="Office">
+      <a:majorFont>
+        <a:latin typeface="Arial"/>
+        <a:ea typeface=""/>
+        <a:cs typeface=""/>
+        <a:font script="Jpan" typeface="ＭＳ Ｐゴシック"/>
+        <a:font script="Hang" typeface="맑은 고딕"/>
+        <a:font script="Hans" typeface="宋体"/>
+        <a:font script="Hant" typeface="新細明體"/>
+        <a:font script="Arab" typeface="Times New Roman"/>
+        <a:font script="Hebr" typeface="Times New Roman"/>
+        <a:font script="Thai" typeface="Angsana New"/>
+        <a:font script="Ethi" typeface="Nyala"/>
+        <a:font script="Beng" typeface="Vrinda"/>
+        <a:font script="Gujr" typeface="Shruti"/>
+        <a:font script="Khmr" typeface="MoolBoran"/>
+        <a:font script="Knda" typeface="Tunga"/>
+        <a:font script="Guru" typeface="Raavi"/>
+        <a:font script="Cans" typeface="Euphemia"/>
+        <a:font script="Cher" typeface="Plantagenet Cherokee"/>
+        <a:font script="Yiii" typeface="Microsoft Yi Baiti"/>
+        <a:font script="Tibt" typeface="Microsoft Himalaya"/>
+        <a:font script="Thaa" typeface="MV Boli"/>
+        <a:font script="Deva" typeface="Mangal"/>
+        <a:font script="Telu" typeface="Gautami"/>
+        <a:font script="Taml" typeface="Latha"/>
+        <a:font script="Syrc" typeface="Estrangelo Edessa"/>
+        <a:font script="Orya" typeface="Kalinga"/>
+        <a:font script="Mlym" typeface="Kartika"/>
+        <a:font script="Laoo" typeface="DokChampa"/>
+        <a:font script="Sinh" typeface="Iskoola Pota"/>
+        <a:font script="Mong" typeface="Mongolian Baiti"/>
+        <a:font script="Viet" typeface="Times New Roman"/>
+        <a:font script="Uigh" typeface="Microsoft Uighur"/>
+        <a:font script="Geor" typeface="Sylfaen"/>
+      </a:majorFont>
+      <a:minorFont>
+        <a:latin typeface="Arial"/>
+        <a:ea typeface=""/>
+        <a:cs typeface=""/>
+        <a:font script="Jpan" typeface="ＭＳ Ｐゴシック"/>
+        <a:font script="Hang" typeface="맑은 고딕"/>
+        <a:font script="Hans" typeface="宋体"/>
+        <a:font script="Hant" typeface="新細明體"/>
+        <a:font script="Arab" typeface="Arial"/>
+        <a:font script="Hebr" typeface="Arial"/>
+        <a:font script="Thai" typeface="Cordia New"/>
+        <a:font script="Ethi" typeface="Nyala"/>
+        <a:font script="Beng" typeface="Vrinda"/>
+        <a:font script="Gujr" typeface="Shruti"/>
+        <a:font script="Khmr" typeface="DaunPenh"/>
+        <a:font script="Knda" typeface="Tunga"/>
+        <a:font script="Guru" typeface="Raavi"/>
+        <a:font script="Cans" typeface="Euphemia"/>
+        <a:font script="Cher" typeface="Plantagenet Cherokee"/>
+        <a:font script="Yiii" typeface="Microsoft Yi Baiti"/>
+        <a:font script="Tibt" typeface="Microsoft Himalaya"/>
+        <a:font script="Thaa" typeface="MV Boli"/>
+        <a:font script="Deva" typeface="Mangal"/>
+        <a:font script="Telu" typeface="Gautami"/>
+        <a:font script="Taml" typeface="Latha"/>
+        <a:font script="Syrc" typeface="Estrangelo Edessa"/>
+        <a:font script="Orya" typeface="Kalinga"/>
+        <a:font script="Mlym" typeface="Kartika"/>
+        <a:font script="Laoo" typeface="DokChampa"/>
+        <a:font script="Sinh" typeface="Iskoola Pota"/>
+        <a:font script="Mong" typeface="Mongolian Baiti"/>
+        <a:font script="Viet" typeface="Arial"/>
+        <a:font script="Uigh" typeface="Microsoft Uighur"/>
+        <a:font script="Geor" typeface="Sylfaen"/>
+      </a:minorFont>
+    </a:fontScheme>
+    <a:fmtScheme name="Office">
+      <a:fillStyleLst>
+        <a:solidFill>
+          <a:schemeClr val="phClr"/>
+        </a:solidFill>
+        <a:gradFill rotWithShape="1">
+          <a:gsLst>
+            <a:gs pos="0">
+              <a:schemeClr val="phClr">
+                <a:tint val="50000"/>
+                <a:satMod val="300000"/>
+              </a:schemeClr>
+            </a:gs>
+            <a:gs pos="35000">
+              <a:schemeClr val="phClr">
+                <a:tint val="37000"/>
+                <a:satMod val="300000"/>
+              </a:schemeClr>
+            </a:gs>
+            <a:gs pos="100000">
+              <a:schemeClr val="phClr">
+                <a:tint val="15000"/>
+                <a:satMod val="350000"/>
+              </a:schemeClr>
+            </a:gs>
+          </a:gsLst>
+          <a:lin ang="16200000" scaled="1"/>
+        </a:gradFill>
+        <a:gradFill rotWithShape="1">
+          <a:gsLst>
+            <a:gs pos="0">
+              <a:schemeClr val="phClr">
+                <a:tint val="100000"/>
+                <a:shade val="100000"/>
+                <a:satMod val="130000"/>
+              </a:schemeClr>
+            </a:gs>
+            <a:gs pos="100000">
+              <a:schemeClr val="phClr">
+                <a:tint val="50000"/>
+                <a:shade val="100000"/>
+                <a:satMod val="350000"/>
+              </a:schemeClr>
+            </a:gs>
+          </a:gsLst>
+          <a:lin ang="16200000" scaled="0"/>
+        </a:gradFill>
+      </a:fillStyleLst>
+      <a:lnStyleLst>
+        <a:ln w="9525" cap="flat" cmpd="sng" algn="ctr">
+          <a:solidFill>
+            <a:schemeClr val="phClr">
+              <a:shade val="95000"/>
+              <a:satMod val="105000"/>
+            </a:schemeClr>
+          </a:solidFill>
+          <a:prstDash val="solid"/>
+        </a:ln>
+        <a:ln w="25400" cap="flat" cmpd="sng" algn="ctr">
+          <a:solidFill>
+            <a:schemeClr val="phClr"/>
+          </a:solidFill>
+          <a:prstDash val="solid"/>
+        </a:ln>
+        <a:ln w="38100" cap="flat" cmpd="sng" algn="ctr">
+          <a:solidFill>
+            <a:schemeClr val="phClr"/>
+          </a:solidFill>
+          <a:prstDash val="solid"/>
+        </a:ln>
+      </a:lnStyleLst>
+      <a:effectStyleLst>
+        <a:effectStyle>
+          <a:effectLst>
+            <a:outerShdw blurRad="40000" dist="20000" dir="5400000" rotWithShape="0">
+              <a:srgbClr val="000000">
+                <a:alpha val="38000"/>
+              </a:srgbClr>
+            </a:outerShdw>
+          </a:effectLst>
+        </a:effectStyle>
+        <a:effectStyle>
+          <a:effectLst>
+            <a:outerShdw blurRad="40000" dist="23000" dir="5400000" rotWithShape="0">
+              <a:srgbClr val="000000">
+                <a:alpha val="35000"/>
+              </a:srgbClr>
+            </a:outerShdw>
+          </a:effectLst>
+        </a:effectStyle>
+        <a:effectStyle>
+          <a:effectLst>
+            <a:outerShdw blurRad="40000" dist="23000" dir="5400000" rotWithShape="0">
+              <a:srgbClr val="000000">
+                <a:alpha val="35000"/>
+              </a:srgbClr>
+            </a:outerShdw>
+          </a:effectLst>
+          <a:scene3d>
+            <a:camera prst="orthographicFront">
+              <a:rot lat="0" lon="0" rev="0"/>
+            </a:camera>
+            <a:lightRig rig="threePt" dir="t">
+              <a:rot lat="0" lon="0" rev="1200000"/>
+            </a:lightRig>
+          </a:scene3d>
+          <a:sp3d>
+            <a:bevelT w="63500" h="25400"/>
+          </a:sp3d>
+        </a:effectStyle>
+      </a:effectStyleLst>
+      <a:bgFillStyleLst>
+        <a:solidFill>
+          <a:schemeClr val="phClr"/>
+        </a:solidFill>
+        <a:gradFill rotWithShape="1">
+          <a:gsLst>
+            <a:gs pos="0">
+              <a:schemeClr val="phClr">
+                <a:tint val="40000"/>
+                <a:satMod val="350000"/>
+              </a:schemeClr>
+            </a:gs>
+            <a:gs pos="40000">
+              <a:schemeClr val="phClr">
+                <a:tint val="45000"/>
+                <a:shade val="99000"/>
+                <a:satMod val="350000"/>
+              </a:schemeClr>
+            </a:gs>
+            <a:gs pos="100000">
+              <a:schemeClr val="phClr">
+                <a:shade val="20000"/>
+                <a:satMod val="255000"/>
+              </a:schemeClr>
+            </a:gs>
+          </a:gsLst>
+          <a:path path="circle">
+            <a:fillToRect l="50000" t="-80000" r="50000" b="180000"/>
+          </a:path>
+        </a:gradFill>
+        <a:gradFill rotWithShape="1">
+          <a:gsLst>
+            <a:gs pos="0">
+              <a:schemeClr val="phClr">
+                <a:tint val="80000"/>
+                <a:satMod val="300000"/>
+              </a:schemeClr>
+            </a:gs>
+            <a:gs pos="100000">
+              <a:schemeClr val="phClr">
+                <a:shade val="30000"/>
+                <a:satMod val="200000"/>
+              </a:schemeClr>
+            </a:gs>
+          </a:gsLst>
+          <a:path path="circle">
+            <a:fillToRect l="50000" t="50000" r="50000" b="50000"/>
+          </a:path>
+        </a:gradFill>
+      </a:bgFillStyleLst>
+    </a:fmtScheme>
+  </a:themeElements>
+</a:theme>
+</file>
+
+<file path=ppt/theme/theme2.xml><?xml version="1.0" encoding="utf-8"?>
 <a:theme xmlns:a="http://schemas.openxmlformats.org/drawingml/2006/main" xmlns:r="http://schemas.openxmlformats.org/officeDocument/2006/relationships">
   <a:themeElements>
     <a:clrScheme name="Default">
@@ -9105,283 +9558,4 @@
     </a:fmtScheme>
   </a:themeElements>
 </a:theme>
-</file>
-
-<file path=ppt/theme/theme2.xml><?xml version="1.0" encoding="utf-8"?>
-<a:theme xmlns:a="http://schemas.openxmlformats.org/drawingml/2006/main" xmlns:r="http://schemas.openxmlformats.org/officeDocument/2006/relationships" name="Slate">
-  <a:themeElements>
-    <a:clrScheme name="Slate">
-      <a:dk1>
-        <a:srgbClr val="FFFFFF"/>
-      </a:dk1>
-      <a:lt1>
-        <a:srgbClr val="37474F"/>
-      </a:lt1>
-      <a:dk2>
-        <a:srgbClr val="9E9E9E"/>
-      </a:dk2>
-      <a:lt2>
-        <a:srgbClr val="E0E0E0"/>
-      </a:lt2>
-      <a:accent1>
-        <a:srgbClr val="616161"/>
-      </a:accent1>
-      <a:accent2>
-        <a:srgbClr val="78909C"/>
-      </a:accent2>
-      <a:accent3>
-        <a:srgbClr val="CACACA"/>
-      </a:accent3>
-      <a:accent4>
-        <a:srgbClr val="64FFDA"/>
-      </a:accent4>
-      <a:accent5>
-        <a:srgbClr val="FFD966"/>
-      </a:accent5>
-      <a:accent6>
-        <a:srgbClr val="F5F5F5"/>
-      </a:accent6>
-      <a:hlink>
-        <a:srgbClr val="FFD966"/>
-      </a:hlink>
-      <a:folHlink>
-        <a:srgbClr val="FFD966"/>
-      </a:folHlink>
-    </a:clrScheme>
-    <a:fontScheme name="Office">
-      <a:majorFont>
-        <a:latin typeface="Arial"/>
-        <a:ea typeface=""/>
-        <a:cs typeface=""/>
-        <a:font script="Jpan" typeface="ＭＳ Ｐゴシック"/>
-        <a:font script="Hang" typeface="맑은 고딕"/>
-        <a:font script="Hans" typeface="宋体"/>
-        <a:font script="Hant" typeface="新細明體"/>
-        <a:font script="Arab" typeface="Times New Roman"/>
-        <a:font script="Hebr" typeface="Times New Roman"/>
-        <a:font script="Thai" typeface="Angsana New"/>
-        <a:font script="Ethi" typeface="Nyala"/>
-        <a:font script="Beng" typeface="Vrinda"/>
-        <a:font script="Gujr" typeface="Shruti"/>
-        <a:font script="Khmr" typeface="MoolBoran"/>
-        <a:font script="Knda" typeface="Tunga"/>
-        <a:font script="Guru" typeface="Raavi"/>
-        <a:font script="Cans" typeface="Euphemia"/>
-        <a:font script="Cher" typeface="Plantagenet Cherokee"/>
-        <a:font script="Yiii" typeface="Microsoft Yi Baiti"/>
-        <a:font script="Tibt" typeface="Microsoft Himalaya"/>
-        <a:font script="Thaa" typeface="MV Boli"/>
-        <a:font script="Deva" typeface="Mangal"/>
-        <a:font script="Telu" typeface="Gautami"/>
-        <a:font script="Taml" typeface="Latha"/>
-        <a:font script="Syrc" typeface="Estrangelo Edessa"/>
-        <a:font script="Orya" typeface="Kalinga"/>
-        <a:font script="Mlym" typeface="Kartika"/>
-        <a:font script="Laoo" typeface="DokChampa"/>
-        <a:font script="Sinh" typeface="Iskoola Pota"/>
-        <a:font script="Mong" typeface="Mongolian Baiti"/>
-        <a:font script="Viet" typeface="Times New Roman"/>
-        <a:font script="Uigh" typeface="Microsoft Uighur"/>
-        <a:font script="Geor" typeface="Sylfaen"/>
-      </a:majorFont>
-      <a:minorFont>
-        <a:latin typeface="Arial"/>
-        <a:ea typeface=""/>
-        <a:cs typeface=""/>
-        <a:font script="Jpan" typeface="ＭＳ Ｐゴシック"/>
-        <a:font script="Hang" typeface="맑은 고딕"/>
-        <a:font script="Hans" typeface="宋体"/>
-        <a:font script="Hant" typeface="新細明體"/>
-        <a:font script="Arab" typeface="Arial"/>
-        <a:font script="Hebr" typeface="Arial"/>
-        <a:font script="Thai" typeface="Cordia New"/>
-        <a:font script="Ethi" typeface="Nyala"/>
-        <a:font script="Beng" typeface="Vrinda"/>
-        <a:font script="Gujr" typeface="Shruti"/>
-        <a:font script="Khmr" typeface="DaunPenh"/>
-        <a:font script="Knda" typeface="Tunga"/>
-        <a:font script="Guru" typeface="Raavi"/>
-        <a:font script="Cans" typeface="Euphemia"/>
-        <a:font script="Cher" typeface="Plantagenet Cherokee"/>
-        <a:font script="Yiii" typeface="Microsoft Yi Baiti"/>
-        <a:font script="Tibt" typeface="Microsoft Himalaya"/>
-        <a:font script="Thaa" typeface="MV Boli"/>
-        <a:font script="Deva" typeface="Mangal"/>
-        <a:font script="Telu" typeface="Gautami"/>
-        <a:font script="Taml" typeface="Latha"/>
-        <a:font script="Syrc" typeface="Estrangelo Edessa"/>
-        <a:font script="Orya" typeface="Kalinga"/>
-        <a:font script="Mlym" typeface="Kartika"/>
-        <a:font script="Laoo" typeface="DokChampa"/>
-        <a:font script="Sinh" typeface="Iskoola Pota"/>
-        <a:font script="Mong" typeface="Mongolian Baiti"/>
-        <a:font script="Viet" typeface="Arial"/>
-        <a:font script="Uigh" typeface="Microsoft Uighur"/>
-        <a:font script="Geor" typeface="Sylfaen"/>
-      </a:minorFont>
-    </a:fontScheme>
-    <a:fmtScheme name="Office">
-      <a:fillStyleLst>
-        <a:solidFill>
-          <a:schemeClr val="phClr"/>
-        </a:solidFill>
-        <a:gradFill rotWithShape="1">
-          <a:gsLst>
-            <a:gs pos="0">
-              <a:schemeClr val="phClr">
-                <a:tint val="50000"/>
-                <a:satMod val="300000"/>
-              </a:schemeClr>
-            </a:gs>
-            <a:gs pos="35000">
-              <a:schemeClr val="phClr">
-                <a:tint val="37000"/>
-                <a:satMod val="300000"/>
-              </a:schemeClr>
-            </a:gs>
-            <a:gs pos="100000">
-              <a:schemeClr val="phClr">
-                <a:tint val="15000"/>
-                <a:satMod val="350000"/>
-              </a:schemeClr>
-            </a:gs>
-          </a:gsLst>
-          <a:lin ang="16200000" scaled="1"/>
-        </a:gradFill>
-        <a:gradFill rotWithShape="1">
-          <a:gsLst>
-            <a:gs pos="0">
-              <a:schemeClr val="phClr">
-                <a:tint val="100000"/>
-                <a:shade val="100000"/>
-                <a:satMod val="130000"/>
-              </a:schemeClr>
-            </a:gs>
-            <a:gs pos="100000">
-              <a:schemeClr val="phClr">
-                <a:tint val="50000"/>
-                <a:shade val="100000"/>
-                <a:satMod val="350000"/>
-              </a:schemeClr>
-            </a:gs>
-          </a:gsLst>
-          <a:lin ang="16200000" scaled="0"/>
-        </a:gradFill>
-      </a:fillStyleLst>
-      <a:lnStyleLst>
-        <a:ln w="9525" cap="flat" cmpd="sng" algn="ctr">
-          <a:solidFill>
-            <a:schemeClr val="phClr">
-              <a:shade val="95000"/>
-              <a:satMod val="105000"/>
-            </a:schemeClr>
-          </a:solidFill>
-          <a:prstDash val="solid"/>
-        </a:ln>
-        <a:ln w="25400" cap="flat" cmpd="sng" algn="ctr">
-          <a:solidFill>
-            <a:schemeClr val="phClr"/>
-          </a:solidFill>
-          <a:prstDash val="solid"/>
-        </a:ln>
-        <a:ln w="38100" cap="flat" cmpd="sng" algn="ctr">
-          <a:solidFill>
-            <a:schemeClr val="phClr"/>
-          </a:solidFill>
-          <a:prstDash val="solid"/>
-        </a:ln>
-      </a:lnStyleLst>
-      <a:effectStyleLst>
-        <a:effectStyle>
-          <a:effectLst>
-            <a:outerShdw blurRad="40000" dist="20000" dir="5400000" rotWithShape="0">
-              <a:srgbClr val="000000">
-                <a:alpha val="38000"/>
-              </a:srgbClr>
-            </a:outerShdw>
-          </a:effectLst>
-        </a:effectStyle>
-        <a:effectStyle>
-          <a:effectLst>
-            <a:outerShdw blurRad="40000" dist="23000" dir="5400000" rotWithShape="0">
-              <a:srgbClr val="000000">
-                <a:alpha val="35000"/>
-              </a:srgbClr>
-            </a:outerShdw>
-          </a:effectLst>
-        </a:effectStyle>
-        <a:effectStyle>
-          <a:effectLst>
-            <a:outerShdw blurRad="40000" dist="23000" dir="5400000" rotWithShape="0">
-              <a:srgbClr val="000000">
-                <a:alpha val="35000"/>
-              </a:srgbClr>
-            </a:outerShdw>
-          </a:effectLst>
-          <a:scene3d>
-            <a:camera prst="orthographicFront">
-              <a:rot lat="0" lon="0" rev="0"/>
-            </a:camera>
-            <a:lightRig rig="threePt" dir="t">
-              <a:rot lat="0" lon="0" rev="1200000"/>
-            </a:lightRig>
-          </a:scene3d>
-          <a:sp3d>
-            <a:bevelT w="63500" h="25400"/>
-          </a:sp3d>
-        </a:effectStyle>
-      </a:effectStyleLst>
-      <a:bgFillStyleLst>
-        <a:solidFill>
-          <a:schemeClr val="phClr"/>
-        </a:solidFill>
-        <a:gradFill rotWithShape="1">
-          <a:gsLst>
-            <a:gs pos="0">
-              <a:schemeClr val="phClr">
-                <a:tint val="40000"/>
-                <a:satMod val="350000"/>
-              </a:schemeClr>
-            </a:gs>
-            <a:gs pos="40000">
-              <a:schemeClr val="phClr">
-                <a:tint val="45000"/>
-                <a:shade val="99000"/>
-                <a:satMod val="350000"/>
-              </a:schemeClr>
-            </a:gs>
-            <a:gs pos="100000">
-              <a:schemeClr val="phClr">
-                <a:shade val="20000"/>
-                <a:satMod val="255000"/>
-              </a:schemeClr>
-            </a:gs>
-          </a:gsLst>
-          <a:path path="circle">
-            <a:fillToRect l="50000" t="-80000" r="50000" b="180000"/>
-          </a:path>
-        </a:gradFill>
-        <a:gradFill rotWithShape="1">
-          <a:gsLst>
-            <a:gs pos="0">
-              <a:schemeClr val="phClr">
-                <a:tint val="80000"/>
-                <a:satMod val="300000"/>
-              </a:schemeClr>
-            </a:gs>
-            <a:gs pos="100000">
-              <a:schemeClr val="phClr">
-                <a:shade val="30000"/>
-                <a:satMod val="200000"/>
-              </a:schemeClr>
-            </a:gs>
-          </a:gsLst>
-          <a:path path="circle">
-            <a:fillToRect l="50000" t="50000" r="50000" b="50000"/>
-          </a:path>
-        </a:gradFill>
-      </a:bgFillStyleLst>
-    </a:fmtScheme>
-  </a:themeElements>
-</a:theme>
 </file>
</xml_diff>

<commit_message>
completed revisions after project review recommended by Joe and morgan
</commit_message>
<xml_diff>
--- a/Machine-Predictive-Maintenance.pptx
+++ b/Machine-Predictive-Maintenance.pptx
@@ -20,30 +20,32 @@
     <p:sldId id="265" r:id="rId15"/>
     <p:sldId id="266" r:id="rId16"/>
     <p:sldId id="267" r:id="rId17"/>
+    <p:sldId id="268" r:id="rId18"/>
+    <p:sldId id="269" r:id="rId19"/>
   </p:sldIdLst>
   <p:sldSz cy="5143500" cx="9144000"/>
   <p:notesSz cx="6858000" cy="9144000"/>
   <p:embeddedFontLst>
     <p:embeddedFont>
       <p:font typeface="Roboto"/>
-      <p:regular r:id="rId18"/>
-      <p:bold r:id="rId19"/>
-      <p:italic r:id="rId20"/>
-      <p:boldItalic r:id="rId21"/>
+      <p:regular r:id="rId20"/>
+      <p:bold r:id="rId21"/>
+      <p:italic r:id="rId22"/>
+      <p:boldItalic r:id="rId23"/>
     </p:embeddedFont>
     <p:embeddedFont>
       <p:font typeface="Oswald Light"/>
-      <p:regular r:id="rId22"/>
-      <p:bold r:id="rId23"/>
+      <p:regular r:id="rId24"/>
+      <p:bold r:id="rId25"/>
     </p:embeddedFont>
     <p:embeddedFont>
       <p:font typeface="Average"/>
-      <p:regular r:id="rId24"/>
+      <p:regular r:id="rId26"/>
     </p:embeddedFont>
     <p:embeddedFont>
       <p:font typeface="Oswald"/>
-      <p:regular r:id="rId25"/>
-      <p:bold r:id="rId26"/>
+      <p:regular r:id="rId27"/>
+      <p:bold r:id="rId28"/>
     </p:embeddedFont>
   </p:embeddedFontLst>
   <p:defaultTextStyle>
@@ -824,7 +826,7 @@
   <p:cSld>
     <p:spTree>
       <p:nvGrpSpPr>
-        <p:cNvPr id="133" name="Shape 133"/>
+        <p:cNvPr id="132" name="Shape 132"/>
         <p:cNvGrpSpPr/>
         <p:nvPr/>
       </p:nvGrpSpPr>
@@ -838,7 +840,7 @@
       </p:grpSpPr>
       <p:sp>
         <p:nvSpPr>
-          <p:cNvPr id="134" name="Google Shape;134;g155ad78816a_0_0:notes"/>
+          <p:cNvPr id="133" name="Google Shape;133;g1b0c1798393_0_41:notes"/>
           <p:cNvSpPr/>
           <p:nvPr>
             <p:ph idx="2" type="sldImg"/>
@@ -873,7 +875,205 @@
       </p:sp>
       <p:sp>
         <p:nvSpPr>
-          <p:cNvPr id="135" name="Google Shape;135;g155ad78816a_0_0:notes"/>
+          <p:cNvPr id="134" name="Google Shape;134;g1b0c1798393_0_41:notes"/>
+          <p:cNvSpPr txBox="1"/>
+          <p:nvPr>
+            <p:ph idx="1" type="body"/>
+          </p:nvPr>
+        </p:nvSpPr>
+        <p:spPr>
+          <a:xfrm>
+            <a:off x="685800" y="4343400"/>
+            <a:ext cx="5486400" cy="4114800"/>
+          </a:xfrm>
+          <a:prstGeom prst="rect">
+            <a:avLst/>
+          </a:prstGeom>
+        </p:spPr>
+        <p:txBody>
+          <a:bodyPr anchorCtr="0" anchor="t" bIns="91425" lIns="91425" spcFirstLastPara="1" rIns="91425" wrap="square" tIns="91425">
+            <a:noAutofit/>
+          </a:bodyPr>
+          <a:lstStyle/>
+          <a:p>
+            <a:pPr indent="0" lvl="0" marL="0" rtl="0" algn="l">
+              <a:spcBef>
+                <a:spcPts val="0"/>
+              </a:spcBef>
+              <a:spcAft>
+                <a:spcPts val="0"/>
+              </a:spcAft>
+              <a:buNone/>
+            </a:pPr>
+            <a:r>
+              <a:t/>
+            </a:r>
+            <a:endParaRPr/>
+          </a:p>
+        </p:txBody>
+      </p:sp>
+    </p:spTree>
+  </p:cSld>
+  <p:clrMapOvr>
+    <a:masterClrMapping/>
+  </p:clrMapOvr>
+</p:notes>
+</file>
+
+<file path=ppt/notesSlides/notesSlide11.xml><?xml version="1.0" encoding="utf-8"?>
+<p:notes xmlns:a="http://schemas.openxmlformats.org/drawingml/2006/main" xmlns:r="http://schemas.openxmlformats.org/officeDocument/2006/relationships" xmlns:mc="http://schemas.openxmlformats.org/markup-compatibility/2006" xmlns:mv="urn:schemas-microsoft-com:mac:vml" xmlns:p="http://schemas.openxmlformats.org/presentationml/2006/main" xmlns:c="http://schemas.openxmlformats.org/drawingml/2006/chart" xmlns:dgm="http://schemas.openxmlformats.org/drawingml/2006/diagram" xmlns:o="urn:schemas-microsoft-com:office:office" xmlns:v="urn:schemas-microsoft-com:vml" xmlns:pvml="urn:schemas-microsoft-com:office:powerpoint" xmlns:com="http://schemas.openxmlformats.org/drawingml/2006/compatibility" xmlns:p14="http://schemas.microsoft.com/office/powerpoint/2010/main" xmlns:p15="http://schemas.microsoft.com/office/powerpoint/2012/main" xmlns:ahyp="http://schemas.microsoft.com/office/drawing/2018/hyperlinkcolor" showMasterPhAnim="0" showMasterSp="0">
+  <p:cSld>
+    <p:spTree>
+      <p:nvGrpSpPr>
+        <p:cNvPr id="141" name="Shape 141"/>
+        <p:cNvGrpSpPr/>
+        <p:nvPr/>
+      </p:nvGrpSpPr>
+      <p:grpSpPr>
+        <a:xfrm>
+          <a:off x="0" y="0"/>
+          <a:ext cx="0" cy="0"/>
+          <a:chOff x="0" y="0"/>
+          <a:chExt cx="0" cy="0"/>
+        </a:xfrm>
+      </p:grpSpPr>
+      <p:sp>
+        <p:nvSpPr>
+          <p:cNvPr id="142" name="Google Shape;142;g1b0c1798393_0_21:notes"/>
+          <p:cNvSpPr/>
+          <p:nvPr>
+            <p:ph idx="2" type="sldImg"/>
+          </p:nvPr>
+        </p:nvSpPr>
+        <p:spPr>
+          <a:xfrm>
+            <a:off x="381300" y="685800"/>
+            <a:ext cx="6096000" cy="3429000"/>
+          </a:xfrm>
+          <a:custGeom>
+            <a:rect b="b" l="l" r="r" t="t"/>
+            <a:pathLst>
+              <a:path extrusionOk="0" h="120000" w="120000">
+                <a:moveTo>
+                  <a:pt x="0" y="0"/>
+                </a:moveTo>
+                <a:lnTo>
+                  <a:pt x="120000" y="0"/>
+                </a:lnTo>
+                <a:lnTo>
+                  <a:pt x="120000" y="120000"/>
+                </a:lnTo>
+                <a:lnTo>
+                  <a:pt x="0" y="120000"/>
+                </a:lnTo>
+                <a:close/>
+              </a:path>
+            </a:pathLst>
+          </a:custGeom>
+        </p:spPr>
+      </p:sp>
+      <p:sp>
+        <p:nvSpPr>
+          <p:cNvPr id="143" name="Google Shape;143;g1b0c1798393_0_21:notes"/>
+          <p:cNvSpPr txBox="1"/>
+          <p:nvPr>
+            <p:ph idx="1" type="body"/>
+          </p:nvPr>
+        </p:nvSpPr>
+        <p:spPr>
+          <a:xfrm>
+            <a:off x="685800" y="4343400"/>
+            <a:ext cx="5486400" cy="4114800"/>
+          </a:xfrm>
+          <a:prstGeom prst="rect">
+            <a:avLst/>
+          </a:prstGeom>
+        </p:spPr>
+        <p:txBody>
+          <a:bodyPr anchorCtr="0" anchor="t" bIns="91425" lIns="91425" spcFirstLastPara="1" rIns="91425" wrap="square" tIns="91425">
+            <a:noAutofit/>
+          </a:bodyPr>
+          <a:lstStyle/>
+          <a:p>
+            <a:pPr indent="0" lvl="0" marL="0" rtl="0" algn="l">
+              <a:spcBef>
+                <a:spcPts val="0"/>
+              </a:spcBef>
+              <a:spcAft>
+                <a:spcPts val="0"/>
+              </a:spcAft>
+              <a:buNone/>
+            </a:pPr>
+            <a:r>
+              <a:t/>
+            </a:r>
+            <a:endParaRPr/>
+          </a:p>
+        </p:txBody>
+      </p:sp>
+    </p:spTree>
+  </p:cSld>
+  <p:clrMapOvr>
+    <a:masterClrMapping/>
+  </p:clrMapOvr>
+</p:notes>
+</file>
+
+<file path=ppt/notesSlides/notesSlide12.xml><?xml version="1.0" encoding="utf-8"?>
+<p:notes xmlns:a="http://schemas.openxmlformats.org/drawingml/2006/main" xmlns:r="http://schemas.openxmlformats.org/officeDocument/2006/relationships" xmlns:mc="http://schemas.openxmlformats.org/markup-compatibility/2006" xmlns:mv="urn:schemas-microsoft-com:mac:vml" xmlns:p="http://schemas.openxmlformats.org/presentationml/2006/main" xmlns:c="http://schemas.openxmlformats.org/drawingml/2006/chart" xmlns:dgm="http://schemas.openxmlformats.org/drawingml/2006/diagram" xmlns:o="urn:schemas-microsoft-com:office:office" xmlns:v="urn:schemas-microsoft-com:vml" xmlns:pvml="urn:schemas-microsoft-com:office:powerpoint" xmlns:com="http://schemas.openxmlformats.org/drawingml/2006/compatibility" xmlns:p14="http://schemas.microsoft.com/office/powerpoint/2010/main" xmlns:p15="http://schemas.microsoft.com/office/powerpoint/2012/main" xmlns:ahyp="http://schemas.microsoft.com/office/drawing/2018/hyperlinkcolor" showMasterPhAnim="0" showMasterSp="0">
+  <p:cSld>
+    <p:spTree>
+      <p:nvGrpSpPr>
+        <p:cNvPr id="149" name="Shape 149"/>
+        <p:cNvGrpSpPr/>
+        <p:nvPr/>
+      </p:nvGrpSpPr>
+      <p:grpSpPr>
+        <a:xfrm>
+          <a:off x="0" y="0"/>
+          <a:ext cx="0" cy="0"/>
+          <a:chOff x="0" y="0"/>
+          <a:chExt cx="0" cy="0"/>
+        </a:xfrm>
+      </p:grpSpPr>
+      <p:sp>
+        <p:nvSpPr>
+          <p:cNvPr id="150" name="Google Shape;150;g155ad78816a_0_0:notes"/>
+          <p:cNvSpPr/>
+          <p:nvPr>
+            <p:ph idx="2" type="sldImg"/>
+          </p:nvPr>
+        </p:nvSpPr>
+        <p:spPr>
+          <a:xfrm>
+            <a:off x="381300" y="685800"/>
+            <a:ext cx="6096000" cy="3429000"/>
+          </a:xfrm>
+          <a:custGeom>
+            <a:rect b="b" l="l" r="r" t="t"/>
+            <a:pathLst>
+              <a:path extrusionOk="0" h="120000" w="120000">
+                <a:moveTo>
+                  <a:pt x="0" y="0"/>
+                </a:moveTo>
+                <a:lnTo>
+                  <a:pt x="120000" y="0"/>
+                </a:lnTo>
+                <a:lnTo>
+                  <a:pt x="120000" y="120000"/>
+                </a:lnTo>
+                <a:lnTo>
+                  <a:pt x="0" y="120000"/>
+                </a:lnTo>
+                <a:close/>
+              </a:path>
+            </a:pathLst>
+          </a:custGeom>
+        </p:spPr>
+      </p:sp>
+      <p:sp>
+        <p:nvSpPr>
+          <p:cNvPr id="151" name="Google Shape;151;g155ad78816a_0_0:notes"/>
           <p:cNvSpPr txBox="1"/>
           <p:nvPr>
             <p:ph idx="1" type="body"/>
@@ -922,12 +1122,12 @@
 </p:notes>
 </file>
 
-<file path=ppt/notesSlides/notesSlide11.xml><?xml version="1.0" encoding="utf-8"?>
+<file path=ppt/notesSlides/notesSlide13.xml><?xml version="1.0" encoding="utf-8"?>
 <p:notes xmlns:a="http://schemas.openxmlformats.org/drawingml/2006/main" xmlns:r="http://schemas.openxmlformats.org/officeDocument/2006/relationships" xmlns:mc="http://schemas.openxmlformats.org/markup-compatibility/2006" xmlns:mv="urn:schemas-microsoft-com:mac:vml" xmlns:p="http://schemas.openxmlformats.org/presentationml/2006/main" xmlns:c="http://schemas.openxmlformats.org/drawingml/2006/chart" xmlns:dgm="http://schemas.openxmlformats.org/drawingml/2006/diagram" xmlns:o="urn:schemas-microsoft-com:office:office" xmlns:v="urn:schemas-microsoft-com:vml" xmlns:pvml="urn:schemas-microsoft-com:office:powerpoint" xmlns:com="http://schemas.openxmlformats.org/drawingml/2006/compatibility" xmlns:p14="http://schemas.microsoft.com/office/powerpoint/2010/main" xmlns:p15="http://schemas.microsoft.com/office/powerpoint/2012/main" xmlns:ahyp="http://schemas.microsoft.com/office/drawing/2018/hyperlinkcolor" showMasterPhAnim="0" showMasterSp="0">
   <p:cSld>
     <p:spTree>
       <p:nvGrpSpPr>
-        <p:cNvPr id="139" name="Shape 139"/>
+        <p:cNvPr id="155" name="Shape 155"/>
         <p:cNvGrpSpPr/>
         <p:nvPr/>
       </p:nvGrpSpPr>
@@ -941,7 +1141,7 @@
       </p:grpSpPr>
       <p:sp>
         <p:nvSpPr>
-          <p:cNvPr id="140" name="Google Shape;140;g1356b69a874_0_8:notes"/>
+          <p:cNvPr id="156" name="Google Shape;156;g1356b69a874_0_8:notes"/>
           <p:cNvSpPr/>
           <p:nvPr>
             <p:ph idx="2" type="sldImg"/>
@@ -976,7 +1176,7 @@
       </p:sp>
       <p:sp>
         <p:nvSpPr>
-          <p:cNvPr id="141" name="Google Shape;141;g1356b69a874_0_8:notes"/>
+          <p:cNvPr id="157" name="Google Shape;157;g1356b69a874_0_8:notes"/>
           <p:cNvSpPr txBox="1"/>
           <p:nvPr>
             <p:ph idx="1" type="body"/>
@@ -1062,12 +1262,12 @@
 </p:notes>
 </file>
 
-<file path=ppt/notesSlides/notesSlide12.xml><?xml version="1.0" encoding="utf-8"?>
+<file path=ppt/notesSlides/notesSlide14.xml><?xml version="1.0" encoding="utf-8"?>
 <p:notes xmlns:a="http://schemas.openxmlformats.org/drawingml/2006/main" xmlns:r="http://schemas.openxmlformats.org/officeDocument/2006/relationships" xmlns:mc="http://schemas.openxmlformats.org/markup-compatibility/2006" xmlns:mv="urn:schemas-microsoft-com:mac:vml" xmlns:p="http://schemas.openxmlformats.org/presentationml/2006/main" xmlns:c="http://schemas.openxmlformats.org/drawingml/2006/chart" xmlns:dgm="http://schemas.openxmlformats.org/drawingml/2006/diagram" xmlns:o="urn:schemas-microsoft-com:office:office" xmlns:v="urn:schemas-microsoft-com:vml" xmlns:pvml="urn:schemas-microsoft-com:office:powerpoint" xmlns:com="http://schemas.openxmlformats.org/drawingml/2006/compatibility" xmlns:p14="http://schemas.microsoft.com/office/powerpoint/2010/main" xmlns:p15="http://schemas.microsoft.com/office/powerpoint/2012/main" xmlns:ahyp="http://schemas.microsoft.com/office/drawing/2018/hyperlinkcolor" showMasterPhAnim="0" showMasterSp="0">
   <p:cSld>
     <p:spTree>
       <p:nvGrpSpPr>
-        <p:cNvPr id="146" name="Shape 146"/>
+        <p:cNvPr id="162" name="Shape 162"/>
         <p:cNvGrpSpPr/>
         <p:nvPr/>
       </p:nvGrpSpPr>
@@ -1081,7 +1281,7 @@
       </p:grpSpPr>
       <p:sp>
         <p:nvSpPr>
-          <p:cNvPr id="147" name="Google Shape;147;g1356b69a874_0_22:notes"/>
+          <p:cNvPr id="163" name="Google Shape;163;g1356b69a874_0_22:notes"/>
           <p:cNvSpPr/>
           <p:nvPr>
             <p:ph idx="2" type="sldImg"/>
@@ -1116,7 +1316,7 @@
       </p:sp>
       <p:sp>
         <p:nvSpPr>
-          <p:cNvPr id="148" name="Google Shape;148;g1356b69a874_0_22:notes"/>
+          <p:cNvPr id="164" name="Google Shape;164;g1356b69a874_0_22:notes"/>
           <p:cNvSpPr txBox="1"/>
           <p:nvPr>
             <p:ph idx="1" type="body"/>
@@ -1955,7 +2155,7 @@
       </p:grpSpPr>
       <p:sp>
         <p:nvSpPr>
-          <p:cNvPr id="126" name="Google Shape;126;g1558826cedc_0_0:notes"/>
+          <p:cNvPr id="126" name="Google Shape;126;g1b0c1798393_0_31:notes"/>
           <p:cNvSpPr/>
           <p:nvPr>
             <p:ph idx="2" type="sldImg"/>
@@ -1990,7 +2190,7 @@
       </p:sp>
       <p:sp>
         <p:nvSpPr>
-          <p:cNvPr id="127" name="Google Shape;127;g1558826cedc_0_0:notes"/>
+          <p:cNvPr id="127" name="Google Shape;127;g1b0c1798393_0_31:notes"/>
           <p:cNvSpPr txBox="1"/>
           <p:nvPr>
             <p:ph idx="1" type="body"/>
@@ -7403,7 +7603,7 @@
   <p:cSld>
     <p:spTree>
       <p:nvGrpSpPr>
-        <p:cNvPr id="136" name="Shape 136"/>
+        <p:cNvPr id="135" name="Shape 135"/>
         <p:cNvGrpSpPr/>
         <p:nvPr/>
       </p:nvGrpSpPr>
@@ -7415,9 +7615,65 @@
           <a:chExt cx="0" cy="0"/>
         </a:xfrm>
       </p:grpSpPr>
+      <p:pic>
+        <p:nvPicPr>
+          <p:cNvPr id="136" name="Google Shape;136;p22"/>
+          <p:cNvPicPr preferRelativeResize="0"/>
+          <p:nvPr/>
+        </p:nvPicPr>
+        <p:blipFill>
+          <a:blip r:embed="rId3">
+            <a:alphaModFix/>
+          </a:blip>
+          <a:stretch>
+            <a:fillRect/>
+          </a:stretch>
+        </p:blipFill>
+        <p:spPr>
+          <a:xfrm>
+            <a:off x="159825" y="118775"/>
+            <a:ext cx="3829161" cy="2428113"/>
+          </a:xfrm>
+          <a:prstGeom prst="rect">
+            <a:avLst/>
+          </a:prstGeom>
+          <a:noFill/>
+          <a:ln>
+            <a:noFill/>
+          </a:ln>
+        </p:spPr>
+      </p:pic>
+      <p:pic>
+        <p:nvPicPr>
+          <p:cNvPr id="137" name="Google Shape;137;p22"/>
+          <p:cNvPicPr preferRelativeResize="0"/>
+          <p:nvPr/>
+        </p:nvPicPr>
+        <p:blipFill>
+          <a:blip r:embed="rId4">
+            <a:alphaModFix/>
+          </a:blip>
+          <a:stretch>
+            <a:fillRect/>
+          </a:stretch>
+        </p:blipFill>
+        <p:spPr>
+          <a:xfrm>
+            <a:off x="5395127" y="118776"/>
+            <a:ext cx="3575798" cy="2428106"/>
+          </a:xfrm>
+          <a:prstGeom prst="rect">
+            <a:avLst/>
+          </a:prstGeom>
+          <a:noFill/>
+          <a:ln>
+            <a:noFill/>
+          </a:ln>
+        </p:spPr>
+      </p:pic>
       <p:sp>
         <p:nvSpPr>
-          <p:cNvPr id="137" name="Google Shape;137;p22"/>
+          <p:cNvPr id="138" name="Google Shape;138;p22"/>
           <p:cNvSpPr txBox="1"/>
           <p:nvPr>
             <p:ph type="title"/>
@@ -7425,8 +7681,8 @@
         </p:nvSpPr>
         <p:spPr>
           <a:xfrm>
-            <a:off x="645900" y="38425"/>
-            <a:ext cx="7852200" cy="861000"/>
+            <a:off x="645900" y="4471750"/>
+            <a:ext cx="7852200" cy="731400"/>
           </a:xfrm>
           <a:prstGeom prst="rect">
             <a:avLst/>
@@ -7449,7 +7705,7 @@
             </a:pPr>
             <a:r>
               <a:rPr lang="en"/>
-              <a:t>CONCLUSIONS</a:t>
+              <a:t>RESULTS</a:t>
             </a:r>
             <a:endParaRPr/>
           </a:p>
@@ -7457,14 +7713,14 @@
       </p:sp>
       <p:sp>
         <p:nvSpPr>
-          <p:cNvPr id="138" name="Google Shape;138;p22"/>
+          <p:cNvPr id="139" name="Google Shape;139;p22"/>
           <p:cNvSpPr txBox="1"/>
           <p:nvPr/>
         </p:nvSpPr>
         <p:spPr>
           <a:xfrm>
-            <a:off x="347850" y="837550"/>
-            <a:ext cx="7126800" cy="1477500"/>
+            <a:off x="386650" y="3167863"/>
+            <a:ext cx="3409800" cy="615600"/>
           </a:xfrm>
           <a:prstGeom prst="rect">
             <a:avLst/>
@@ -7480,92 +7736,63 @@
           </a:bodyPr>
           <a:lstStyle/>
           <a:p>
-            <a:pPr indent="-317500" lvl="0" marL="457200" rtl="0" algn="l">
-              <a:spcBef>
-                <a:spcPts val="0"/>
-              </a:spcBef>
-              <a:spcAft>
-                <a:spcPts val="0"/>
-              </a:spcAft>
-              <a:buSzPts val="1400"/>
-              <a:buFont typeface="Roboto"/>
-              <a:buChar char="-"/>
+            <a:pPr indent="0" lvl="0" marL="0" rtl="0" algn="l">
+              <a:spcBef>
+                <a:spcPts val="0"/>
+              </a:spcBef>
+              <a:spcAft>
+                <a:spcPts val="0"/>
+              </a:spcAft>
+              <a:buNone/>
             </a:pPr>
             <a:r>
               <a:rPr lang="en">
+                <a:solidFill>
+                  <a:schemeClr val="dk1"/>
+                </a:solidFill>
                 <a:latin typeface="Roboto"/>
                 <a:ea typeface="Roboto"/>
                 <a:cs typeface="Roboto"/>
                 <a:sym typeface="Roboto"/>
               </a:rPr>
-              <a:t>Avoid the following to prevent failure:</a:t>
+              <a:t>Final Model has the most incorrect predictions in no failure at 9 out of 1995</a:t>
             </a:r>
             <a:endParaRPr>
+              <a:solidFill>
+                <a:schemeClr val="dk1"/>
+              </a:solidFill>
               <a:latin typeface="Roboto"/>
               <a:ea typeface="Roboto"/>
               <a:cs typeface="Roboto"/>
               <a:sym typeface="Roboto"/>
             </a:endParaRPr>
           </a:p>
-          <a:p>
-            <a:pPr indent="-317500" lvl="1" marL="914400" rtl="0" algn="l">
-              <a:spcBef>
-                <a:spcPts val="0"/>
-              </a:spcBef>
-              <a:spcAft>
-                <a:spcPts val="0"/>
-              </a:spcAft>
-              <a:buSzPts val="1400"/>
-              <a:buFont typeface="Roboto"/>
-              <a:buChar char="-"/>
-            </a:pPr>
-            <a:r>
-              <a:rPr lang="en" sz="1100"/>
-              <a:t>Torque (power failure): less than 20 Nm or more than 58 Nm</a:t>
-            </a:r>
-            <a:endParaRPr sz="1100"/>
-          </a:p>
-          <a:p>
-            <a:pPr indent="-317500" lvl="1" marL="914400" rtl="0" algn="l">
-              <a:spcBef>
-                <a:spcPts val="0"/>
-              </a:spcBef>
-              <a:spcAft>
-                <a:spcPts val="0"/>
-              </a:spcAft>
-              <a:buSzPts val="1400"/>
-              <a:buFont typeface="Roboto"/>
-              <a:buChar char="-"/>
-            </a:pPr>
-            <a:r>
-              <a:rPr lang="en" sz="1100"/>
-              <a:t>Tool Wear (tool wear failure): more than 190 minutes of use</a:t>
-            </a:r>
-            <a:endParaRPr sz="1100"/>
-          </a:p>
-          <a:p>
-            <a:pPr indent="-317500" lvl="1" marL="914400" rtl="0" algn="l">
-              <a:spcBef>
-                <a:spcPts val="0"/>
-              </a:spcBef>
-              <a:spcAft>
-                <a:spcPts val="0"/>
-              </a:spcAft>
-              <a:buSzPts val="1400"/>
-              <a:buFont typeface="Roboto"/>
-              <a:buChar char="-"/>
-            </a:pPr>
-            <a:r>
-              <a:rPr lang="en" sz="1100"/>
-              <a:t>Rotational speed (overstrain and heat dissipation failure): less than 1200 rpm</a:t>
-            </a:r>
-            <a:endParaRPr>
-              <a:latin typeface="Roboto"/>
-              <a:ea typeface="Roboto"/>
-              <a:cs typeface="Roboto"/>
-              <a:sym typeface="Roboto"/>
-            </a:endParaRPr>
-          </a:p>
+        </p:txBody>
+      </p:sp>
+      <p:sp>
+        <p:nvSpPr>
+          <p:cNvPr id="140" name="Google Shape;140;p22"/>
+          <p:cNvSpPr txBox="1"/>
+          <p:nvPr/>
+        </p:nvSpPr>
+        <p:spPr>
+          <a:xfrm>
+            <a:off x="5395125" y="3167875"/>
+            <a:ext cx="3409800" cy="831300"/>
+          </a:xfrm>
+          <a:prstGeom prst="rect">
+            <a:avLst/>
+          </a:prstGeom>
+          <a:noFill/>
+          <a:ln>
+            <a:noFill/>
+          </a:ln>
+        </p:spPr>
+        <p:txBody>
+          <a:bodyPr anchorCtr="0" anchor="t" bIns="91425" lIns="91425" spcFirstLastPara="1" rIns="91425" wrap="square" tIns="91425">
+            <a:spAutoFit/>
+          </a:bodyPr>
+          <a:lstStyle/>
           <a:p>
             <a:pPr indent="0" lvl="0" marL="0" rtl="0" algn="l">
               <a:spcBef>
@@ -7575,39 +7802,23 @@
                 <a:spcPts val="0"/>
               </a:spcAft>
               <a:buNone/>
-            </a:pPr>
-            <a:r>
-              <a:t/>
-            </a:r>
-            <a:endParaRPr>
-              <a:latin typeface="Roboto"/>
-              <a:ea typeface="Roboto"/>
-              <a:cs typeface="Roboto"/>
-              <a:sym typeface="Roboto"/>
-            </a:endParaRPr>
-          </a:p>
-          <a:p>
-            <a:pPr indent="-317500" lvl="0" marL="457200" rtl="0" algn="l">
-              <a:spcBef>
-                <a:spcPts val="0"/>
-              </a:spcBef>
-              <a:spcAft>
-                <a:spcPts val="0"/>
-              </a:spcAft>
-              <a:buSzPts val="1400"/>
-              <a:buFont typeface="Roboto"/>
-              <a:buChar char="-"/>
             </a:pPr>
             <a:r>
               <a:rPr lang="en">
+                <a:solidFill>
+                  <a:schemeClr val="dk1"/>
+                </a:solidFill>
                 <a:latin typeface="Roboto"/>
                 <a:ea typeface="Roboto"/>
                 <a:cs typeface="Roboto"/>
                 <a:sym typeface="Roboto"/>
               </a:rPr>
-              <a:t>Final model 98% accurate with 82% precision</a:t>
+              <a:t>Final Model after removing 2.25% of data at the upper and lower bounds of torque (data above </a:t>
             </a:r>
             <a:endParaRPr>
+              <a:solidFill>
+                <a:schemeClr val="dk1"/>
+              </a:solidFill>
               <a:latin typeface="Roboto"/>
               <a:ea typeface="Roboto"/>
               <a:cs typeface="Roboto"/>
@@ -7629,7 +7840,144 @@
   <p:cSld>
     <p:spTree>
       <p:nvGrpSpPr>
-        <p:cNvPr id="142" name="Shape 142"/>
+        <p:cNvPr id="144" name="Shape 144"/>
+        <p:cNvGrpSpPr/>
+        <p:nvPr/>
+      </p:nvGrpSpPr>
+      <p:grpSpPr>
+        <a:xfrm>
+          <a:off x="0" y="0"/>
+          <a:ext cx="0" cy="0"/>
+          <a:chOff x="0" y="0"/>
+          <a:chExt cx="0" cy="0"/>
+        </a:xfrm>
+      </p:grpSpPr>
+      <p:pic>
+        <p:nvPicPr>
+          <p:cNvPr id="145" name="Google Shape;145;p23"/>
+          <p:cNvPicPr preferRelativeResize="0"/>
+          <p:nvPr/>
+        </p:nvPicPr>
+        <p:blipFill>
+          <a:blip r:embed="rId3">
+            <a:alphaModFix/>
+          </a:blip>
+          <a:stretch>
+            <a:fillRect/>
+          </a:stretch>
+        </p:blipFill>
+        <p:spPr>
+          <a:xfrm>
+            <a:off x="159825" y="118775"/>
+            <a:ext cx="3829161" cy="2428113"/>
+          </a:xfrm>
+          <a:prstGeom prst="rect">
+            <a:avLst/>
+          </a:prstGeom>
+          <a:noFill/>
+          <a:ln>
+            <a:noFill/>
+          </a:ln>
+        </p:spPr>
+      </p:pic>
+      <p:pic>
+        <p:nvPicPr>
+          <p:cNvPr id="146" name="Google Shape;146;p23"/>
+          <p:cNvPicPr preferRelativeResize="0"/>
+          <p:nvPr/>
+        </p:nvPicPr>
+        <p:blipFill>
+          <a:blip r:embed="rId4">
+            <a:alphaModFix/>
+          </a:blip>
+          <a:stretch>
+            <a:fillRect/>
+          </a:stretch>
+        </p:blipFill>
+        <p:spPr>
+          <a:xfrm>
+            <a:off x="5395127" y="118776"/>
+            <a:ext cx="3575798" cy="2428106"/>
+          </a:xfrm>
+          <a:prstGeom prst="rect">
+            <a:avLst/>
+          </a:prstGeom>
+          <a:noFill/>
+          <a:ln>
+            <a:noFill/>
+          </a:ln>
+        </p:spPr>
+      </p:pic>
+      <p:pic>
+        <p:nvPicPr>
+          <p:cNvPr id="147" name="Google Shape;147;p23"/>
+          <p:cNvPicPr preferRelativeResize="0"/>
+          <p:nvPr/>
+        </p:nvPicPr>
+        <p:blipFill>
+          <a:blip r:embed="rId5">
+            <a:alphaModFix/>
+          </a:blip>
+          <a:stretch>
+            <a:fillRect/>
+          </a:stretch>
+        </p:blipFill>
+        <p:spPr>
+          <a:xfrm>
+            <a:off x="5395125" y="2546885"/>
+            <a:ext cx="3575798" cy="2426390"/>
+          </a:xfrm>
+          <a:prstGeom prst="rect">
+            <a:avLst/>
+          </a:prstGeom>
+          <a:noFill/>
+          <a:ln>
+            <a:noFill/>
+          </a:ln>
+        </p:spPr>
+      </p:pic>
+      <p:pic>
+        <p:nvPicPr>
+          <p:cNvPr id="148" name="Google Shape;148;p23"/>
+          <p:cNvPicPr preferRelativeResize="0"/>
+          <p:nvPr/>
+        </p:nvPicPr>
+        <p:blipFill>
+          <a:blip r:embed="rId6">
+            <a:alphaModFix/>
+          </a:blip>
+          <a:stretch>
+            <a:fillRect/>
+          </a:stretch>
+        </p:blipFill>
+        <p:spPr>
+          <a:xfrm>
+            <a:off x="159831" y="2546887"/>
+            <a:ext cx="3829171" cy="2426386"/>
+          </a:xfrm>
+          <a:prstGeom prst="rect">
+            <a:avLst/>
+          </a:prstGeom>
+          <a:noFill/>
+          <a:ln>
+            <a:noFill/>
+          </a:ln>
+        </p:spPr>
+      </p:pic>
+    </p:spTree>
+  </p:cSld>
+  <p:clrMapOvr>
+    <a:masterClrMapping/>
+  </p:clrMapOvr>
+</p:sld>
+</file>
+
+<file path=ppt/slides/slide12.xml><?xml version="1.0" encoding="utf-8"?>
+<p:sld xmlns:a="http://schemas.openxmlformats.org/drawingml/2006/main" xmlns:r="http://schemas.openxmlformats.org/officeDocument/2006/relationships" xmlns:mc="http://schemas.openxmlformats.org/markup-compatibility/2006" xmlns:mv="urn:schemas-microsoft-com:mac:vml" xmlns:p="http://schemas.openxmlformats.org/presentationml/2006/main" xmlns:c="http://schemas.openxmlformats.org/drawingml/2006/chart" xmlns:dgm="http://schemas.openxmlformats.org/drawingml/2006/diagram" xmlns:o="urn:schemas-microsoft-com:office:office" xmlns:v="urn:schemas-microsoft-com:vml" xmlns:pvml="urn:schemas-microsoft-com:office:powerpoint" xmlns:com="http://schemas.openxmlformats.org/drawingml/2006/compatibility" xmlns:p14="http://schemas.microsoft.com/office/powerpoint/2010/main" xmlns:p15="http://schemas.microsoft.com/office/powerpoint/2012/main" xmlns:ahyp="http://schemas.microsoft.com/office/drawing/2018/hyperlinkcolor">
+  <p:cSld>
+    <p:spTree>
+      <p:nvGrpSpPr>
+        <p:cNvPr id="152" name="Shape 152"/>
         <p:cNvGrpSpPr/>
         <p:nvPr/>
       </p:nvGrpSpPr>
@@ -7643,7 +7991,220 @@
       </p:grpSpPr>
       <p:sp>
         <p:nvSpPr>
-          <p:cNvPr id="143" name="Google Shape;143;p23"/>
+          <p:cNvPr id="153" name="Google Shape;153;p24"/>
+          <p:cNvSpPr txBox="1"/>
+          <p:nvPr>
+            <p:ph type="title"/>
+          </p:nvPr>
+        </p:nvSpPr>
+        <p:spPr>
+          <a:xfrm>
+            <a:off x="645900" y="38425"/>
+            <a:ext cx="7852200" cy="861000"/>
+          </a:xfrm>
+          <a:prstGeom prst="rect">
+            <a:avLst/>
+          </a:prstGeom>
+        </p:spPr>
+        <p:txBody>
+          <a:bodyPr anchorCtr="0" anchor="ctr" bIns="91425" lIns="91425" spcFirstLastPara="1" rIns="91425" wrap="square" tIns="91425">
+            <a:noAutofit/>
+          </a:bodyPr>
+          <a:lstStyle/>
+          <a:p>
+            <a:pPr indent="0" lvl="0" marL="0" rtl="0" algn="ctr">
+              <a:spcBef>
+                <a:spcPts val="0"/>
+              </a:spcBef>
+              <a:spcAft>
+                <a:spcPts val="0"/>
+              </a:spcAft>
+              <a:buNone/>
+            </a:pPr>
+            <a:r>
+              <a:rPr lang="en"/>
+              <a:t>CONCLUSIONS</a:t>
+            </a:r>
+            <a:endParaRPr/>
+          </a:p>
+        </p:txBody>
+      </p:sp>
+      <p:sp>
+        <p:nvSpPr>
+          <p:cNvPr id="154" name="Google Shape;154;p24"/>
+          <p:cNvSpPr txBox="1"/>
+          <p:nvPr/>
+        </p:nvSpPr>
+        <p:spPr>
+          <a:xfrm>
+            <a:off x="347850" y="837550"/>
+            <a:ext cx="7126800" cy="1477500"/>
+          </a:xfrm>
+          <a:prstGeom prst="rect">
+            <a:avLst/>
+          </a:prstGeom>
+          <a:noFill/>
+          <a:ln>
+            <a:noFill/>
+          </a:ln>
+        </p:spPr>
+        <p:txBody>
+          <a:bodyPr anchorCtr="0" anchor="t" bIns="91425" lIns="91425" spcFirstLastPara="1" rIns="91425" wrap="square" tIns="91425">
+            <a:spAutoFit/>
+          </a:bodyPr>
+          <a:lstStyle/>
+          <a:p>
+            <a:pPr indent="-317500" lvl="0" marL="457200" rtl="0" algn="l">
+              <a:spcBef>
+                <a:spcPts val="0"/>
+              </a:spcBef>
+              <a:spcAft>
+                <a:spcPts val="0"/>
+              </a:spcAft>
+              <a:buSzPts val="1400"/>
+              <a:buFont typeface="Roboto"/>
+              <a:buChar char="-"/>
+            </a:pPr>
+            <a:r>
+              <a:rPr lang="en">
+                <a:latin typeface="Roboto"/>
+                <a:ea typeface="Roboto"/>
+                <a:cs typeface="Roboto"/>
+                <a:sym typeface="Roboto"/>
+              </a:rPr>
+              <a:t>All types of failure have varying relationships with multiple </a:t>
+            </a:r>
+            <a:r>
+              <a:rPr lang="en">
+                <a:latin typeface="Roboto"/>
+                <a:ea typeface="Roboto"/>
+                <a:cs typeface="Roboto"/>
+                <a:sym typeface="Roboto"/>
+              </a:rPr>
+              <a:t>features</a:t>
+            </a:r>
+            <a:r>
+              <a:rPr lang="en">
+                <a:latin typeface="Roboto"/>
+                <a:ea typeface="Roboto"/>
+                <a:cs typeface="Roboto"/>
+                <a:sym typeface="Roboto"/>
+              </a:rPr>
+              <a:t> in the data</a:t>
+            </a:r>
+            <a:endParaRPr>
+              <a:latin typeface="Roboto"/>
+              <a:ea typeface="Roboto"/>
+              <a:cs typeface="Roboto"/>
+              <a:sym typeface="Roboto"/>
+            </a:endParaRPr>
+          </a:p>
+          <a:p>
+            <a:pPr indent="-317500" lvl="0" marL="457200" rtl="0" algn="l">
+              <a:spcBef>
+                <a:spcPts val="0"/>
+              </a:spcBef>
+              <a:spcAft>
+                <a:spcPts val="0"/>
+              </a:spcAft>
+              <a:buSzPts val="1400"/>
+              <a:buFont typeface="Roboto"/>
+              <a:buChar char="-"/>
+            </a:pPr>
+            <a:r>
+              <a:rPr lang="en">
+                <a:latin typeface="Roboto"/>
+                <a:ea typeface="Roboto"/>
+                <a:cs typeface="Roboto"/>
+                <a:sym typeface="Roboto"/>
+              </a:rPr>
+              <a:t>Highest counts of failure in order are: Heat dissipation, Power failure, Overstrain failure, and Tool Wear.</a:t>
+            </a:r>
+            <a:endParaRPr>
+              <a:latin typeface="Roboto"/>
+              <a:ea typeface="Roboto"/>
+              <a:cs typeface="Roboto"/>
+              <a:sym typeface="Roboto"/>
+            </a:endParaRPr>
+          </a:p>
+          <a:p>
+            <a:pPr indent="0" lvl="0" marL="0" rtl="0" algn="l">
+              <a:spcBef>
+                <a:spcPts val="0"/>
+              </a:spcBef>
+              <a:spcAft>
+                <a:spcPts val="0"/>
+              </a:spcAft>
+              <a:buNone/>
+            </a:pPr>
+            <a:r>
+              <a:t/>
+            </a:r>
+            <a:endParaRPr>
+              <a:latin typeface="Roboto"/>
+              <a:ea typeface="Roboto"/>
+              <a:cs typeface="Roboto"/>
+              <a:sym typeface="Roboto"/>
+            </a:endParaRPr>
+          </a:p>
+          <a:p>
+            <a:pPr indent="-317500" lvl="0" marL="457200" rtl="0" algn="l">
+              <a:spcBef>
+                <a:spcPts val="0"/>
+              </a:spcBef>
+              <a:spcAft>
+                <a:spcPts val="0"/>
+              </a:spcAft>
+              <a:buSzPts val="1400"/>
+              <a:buFont typeface="Roboto"/>
+              <a:buChar char="-"/>
+            </a:pPr>
+            <a:r>
+              <a:rPr lang="en">
+                <a:latin typeface="Roboto"/>
+                <a:ea typeface="Roboto"/>
+                <a:cs typeface="Roboto"/>
+                <a:sym typeface="Roboto"/>
+              </a:rPr>
+              <a:t>By removing outliers in torque feature, final model was able to predict only one incorrect false negative out of 1904 data points.</a:t>
+            </a:r>
+            <a:endParaRPr>
+              <a:latin typeface="Roboto"/>
+              <a:ea typeface="Roboto"/>
+              <a:cs typeface="Roboto"/>
+              <a:sym typeface="Roboto"/>
+            </a:endParaRPr>
+          </a:p>
+        </p:txBody>
+      </p:sp>
+    </p:spTree>
+  </p:cSld>
+  <p:clrMapOvr>
+    <a:masterClrMapping/>
+  </p:clrMapOvr>
+</p:sld>
+</file>
+
+<file path=ppt/slides/slide13.xml><?xml version="1.0" encoding="utf-8"?>
+<p:sld xmlns:a="http://schemas.openxmlformats.org/drawingml/2006/main" xmlns:r="http://schemas.openxmlformats.org/officeDocument/2006/relationships" xmlns:mc="http://schemas.openxmlformats.org/markup-compatibility/2006" xmlns:mv="urn:schemas-microsoft-com:mac:vml" xmlns:p="http://schemas.openxmlformats.org/presentationml/2006/main" xmlns:c="http://schemas.openxmlformats.org/drawingml/2006/chart" xmlns:dgm="http://schemas.openxmlformats.org/drawingml/2006/diagram" xmlns:o="urn:schemas-microsoft-com:office:office" xmlns:v="urn:schemas-microsoft-com:vml" xmlns:pvml="urn:schemas-microsoft-com:office:powerpoint" xmlns:com="http://schemas.openxmlformats.org/drawingml/2006/compatibility" xmlns:p14="http://schemas.microsoft.com/office/powerpoint/2010/main" xmlns:p15="http://schemas.microsoft.com/office/powerpoint/2012/main" xmlns:ahyp="http://schemas.microsoft.com/office/drawing/2018/hyperlinkcolor">
+  <p:cSld>
+    <p:spTree>
+      <p:nvGrpSpPr>
+        <p:cNvPr id="158" name="Shape 158"/>
+        <p:cNvGrpSpPr/>
+        <p:nvPr/>
+      </p:nvGrpSpPr>
+      <p:grpSpPr>
+        <a:xfrm>
+          <a:off x="0" y="0"/>
+          <a:ext cx="0" cy="0"/>
+          <a:chOff x="0" y="0"/>
+          <a:chExt cx="0" cy="0"/>
+        </a:xfrm>
+      </p:grpSpPr>
+      <p:sp>
+        <p:nvSpPr>
+          <p:cNvPr id="159" name="Google Shape;159;p25"/>
           <p:cNvSpPr txBox="1"/>
           <p:nvPr>
             <p:ph type="title"/>
@@ -7683,7 +8244,7 @@
       </p:sp>
       <p:sp>
         <p:nvSpPr>
-          <p:cNvPr id="144" name="Google Shape;144;p23"/>
+          <p:cNvPr id="160" name="Google Shape;160;p25"/>
           <p:cNvSpPr txBox="1"/>
           <p:nvPr/>
         </p:nvSpPr>
@@ -7733,7 +8294,7 @@
       </p:sp>
       <p:sp>
         <p:nvSpPr>
-          <p:cNvPr id="145" name="Google Shape;145;p23"/>
+          <p:cNvPr id="161" name="Google Shape;161;p25"/>
           <p:cNvSpPr txBox="1"/>
           <p:nvPr/>
         </p:nvSpPr>
@@ -7789,12 +8350,12 @@
 </p:sld>
 </file>
 
-<file path=ppt/slides/slide12.xml><?xml version="1.0" encoding="utf-8"?>
+<file path=ppt/slides/slide14.xml><?xml version="1.0" encoding="utf-8"?>
 <p:sld xmlns:a="http://schemas.openxmlformats.org/drawingml/2006/main" xmlns:r="http://schemas.openxmlformats.org/officeDocument/2006/relationships" xmlns:mc="http://schemas.openxmlformats.org/markup-compatibility/2006" xmlns:mv="urn:schemas-microsoft-com:mac:vml" xmlns:p="http://schemas.openxmlformats.org/presentationml/2006/main" xmlns:c="http://schemas.openxmlformats.org/drawingml/2006/chart" xmlns:dgm="http://schemas.openxmlformats.org/drawingml/2006/diagram" xmlns:o="urn:schemas-microsoft-com:office:office" xmlns:v="urn:schemas-microsoft-com:vml" xmlns:pvml="urn:schemas-microsoft-com:office:powerpoint" xmlns:com="http://schemas.openxmlformats.org/drawingml/2006/compatibility" xmlns:p14="http://schemas.microsoft.com/office/powerpoint/2010/main" xmlns:p15="http://schemas.microsoft.com/office/powerpoint/2012/main" xmlns:ahyp="http://schemas.microsoft.com/office/drawing/2018/hyperlinkcolor">
   <p:cSld>
     <p:spTree>
       <p:nvGrpSpPr>
-        <p:cNvPr id="149" name="Shape 149"/>
+        <p:cNvPr id="165" name="Shape 165"/>
         <p:cNvGrpSpPr/>
         <p:nvPr/>
       </p:nvGrpSpPr>
@@ -7808,7 +8369,7 @@
       </p:grpSpPr>
       <p:sp>
         <p:nvSpPr>
-          <p:cNvPr id="150" name="Google Shape;150;p24"/>
+          <p:cNvPr id="166" name="Google Shape;166;p26"/>
           <p:cNvSpPr txBox="1"/>
           <p:nvPr>
             <p:ph type="title"/>
@@ -7929,7 +8490,7 @@
                 <a:cs typeface="Oswald Light"/>
                 <a:sym typeface="Oswald Light"/>
               </a:rPr>
-              <a:t>Deliver a product to Northrup Grumman to predict machine failure</a:t>
+              <a:t>Deliver a product to Northrup Grumman to predict types of machine failure</a:t>
             </a:r>
             <a:endParaRPr sz="5300">
               <a:latin typeface="Oswald Light"/>
@@ -8290,7 +8851,7 @@
                 <a:cs typeface="Roboto"/>
                 <a:sym typeface="Roboto"/>
               </a:rPr>
-              <a:t>Includes information on air temp, process temp, rotational speed, torque, tool wear, and failure</a:t>
+              <a:t>Includes information on air temp, process temp, rotational speed, torque, tool wear, failure, and type of failure</a:t>
             </a:r>
             <a:endParaRPr>
               <a:latin typeface="Roboto"/>
@@ -8456,7 +9017,7 @@
         </p:nvSpPr>
         <p:spPr>
           <a:xfrm>
-            <a:off x="163700" y="66600"/>
+            <a:off x="163700" y="34350"/>
             <a:ext cx="8520600" cy="572700"/>
           </a:xfrm>
           <a:prstGeom prst="rect">
@@ -8486,24 +9047,16 @@
           </a:p>
         </p:txBody>
       </p:sp>
-      <p:pic>
-        <p:nvPicPr>
+      <p:sp>
+        <p:nvSpPr>
           <p:cNvPr id="88" name="Google Shape;88;p17"/>
-          <p:cNvPicPr preferRelativeResize="0"/>
+          <p:cNvSpPr txBox="1"/>
           <p:nvPr/>
-        </p:nvPicPr>
-        <p:blipFill>
-          <a:blip r:embed="rId3">
-            <a:alphaModFix/>
-          </a:blip>
-          <a:stretch>
-            <a:fillRect/>
-          </a:stretch>
-        </p:blipFill>
-        <p:spPr>
-          <a:xfrm>
-            <a:off x="163688" y="639300"/>
-            <a:ext cx="4864466" cy="4199402"/>
+        </p:nvSpPr>
+        <p:spPr>
+          <a:xfrm>
+            <a:off x="5335925" y="1677000"/>
+            <a:ext cx="3596700" cy="2124000"/>
           </a:xfrm>
           <a:prstGeom prst="rect">
             <a:avLst/>
@@ -8513,31 +9066,153 @@
             <a:noFill/>
           </a:ln>
         </p:spPr>
-      </p:pic>
-      <p:sp>
-        <p:nvSpPr>
-          <p:cNvPr id="89" name="Google Shape;89;p17"/>
-          <p:cNvSpPr txBox="1"/>
-          <p:nvPr/>
-        </p:nvSpPr>
-        <p:spPr>
-          <a:xfrm>
-            <a:off x="5380325" y="2156100"/>
-            <a:ext cx="3596700" cy="831300"/>
-          </a:xfrm>
-          <a:prstGeom prst="rect">
-            <a:avLst/>
-          </a:prstGeom>
-          <a:noFill/>
-          <a:ln>
-            <a:noFill/>
-          </a:ln>
-        </p:spPr>
         <p:txBody>
           <a:bodyPr anchorCtr="0" anchor="t" bIns="91425" lIns="91425" spcFirstLastPara="1" rIns="91425" wrap="square" tIns="91425">
             <a:spAutoFit/>
           </a:bodyPr>
           <a:lstStyle/>
+          <a:p>
+            <a:pPr indent="0" lvl="0" marL="0" rtl="0" algn="l">
+              <a:spcBef>
+                <a:spcPts val="0"/>
+              </a:spcBef>
+              <a:spcAft>
+                <a:spcPts val="0"/>
+              </a:spcAft>
+              <a:buNone/>
+            </a:pPr>
+            <a:r>
+              <a:rPr lang="en">
+                <a:solidFill>
+                  <a:schemeClr val="dk1"/>
+                </a:solidFill>
+                <a:latin typeface="Roboto"/>
+                <a:ea typeface="Roboto"/>
+                <a:cs typeface="Roboto"/>
+                <a:sym typeface="Roboto"/>
+              </a:rPr>
+              <a:t>These machine failures are what was provided to us in the dataset</a:t>
+            </a:r>
+            <a:endParaRPr>
+              <a:solidFill>
+                <a:schemeClr val="dk1"/>
+              </a:solidFill>
+              <a:latin typeface="Roboto"/>
+              <a:ea typeface="Roboto"/>
+              <a:cs typeface="Roboto"/>
+              <a:sym typeface="Roboto"/>
+            </a:endParaRPr>
+          </a:p>
+          <a:p>
+            <a:pPr indent="0" lvl="0" marL="0" rtl="0" algn="l">
+              <a:spcBef>
+                <a:spcPts val="0"/>
+              </a:spcBef>
+              <a:spcAft>
+                <a:spcPts val="0"/>
+              </a:spcAft>
+              <a:buNone/>
+            </a:pPr>
+            <a:r>
+              <a:t/>
+            </a:r>
+            <a:endParaRPr>
+              <a:solidFill>
+                <a:schemeClr val="dk1"/>
+              </a:solidFill>
+              <a:latin typeface="Roboto"/>
+              <a:ea typeface="Roboto"/>
+              <a:cs typeface="Roboto"/>
+              <a:sym typeface="Roboto"/>
+            </a:endParaRPr>
+          </a:p>
+          <a:p>
+            <a:pPr indent="0" lvl="0" marL="0" rtl="0" algn="l">
+              <a:spcBef>
+                <a:spcPts val="0"/>
+              </a:spcBef>
+              <a:spcAft>
+                <a:spcPts val="0"/>
+              </a:spcAft>
+              <a:buNone/>
+            </a:pPr>
+            <a:r>
+              <a:rPr lang="en">
+                <a:solidFill>
+                  <a:schemeClr val="dk1"/>
+                </a:solidFill>
+                <a:latin typeface="Roboto"/>
+                <a:ea typeface="Roboto"/>
+                <a:cs typeface="Roboto"/>
+                <a:sym typeface="Roboto"/>
+              </a:rPr>
+              <a:t>9661 No failure data points</a:t>
+            </a:r>
+            <a:endParaRPr>
+              <a:solidFill>
+                <a:schemeClr val="dk1"/>
+              </a:solidFill>
+              <a:latin typeface="Roboto"/>
+              <a:ea typeface="Roboto"/>
+              <a:cs typeface="Roboto"/>
+              <a:sym typeface="Roboto"/>
+            </a:endParaRPr>
+          </a:p>
+          <a:p>
+            <a:pPr indent="0" lvl="0" marL="0" rtl="0" algn="l">
+              <a:spcBef>
+                <a:spcPts val="0"/>
+              </a:spcBef>
+              <a:spcAft>
+                <a:spcPts val="0"/>
+              </a:spcAft>
+              <a:buNone/>
+            </a:pPr>
+            <a:r>
+              <a:rPr lang="en">
+                <a:solidFill>
+                  <a:schemeClr val="dk1"/>
+                </a:solidFill>
+                <a:latin typeface="Roboto"/>
+                <a:ea typeface="Roboto"/>
+                <a:cs typeface="Roboto"/>
+                <a:sym typeface="Roboto"/>
+              </a:rPr>
+              <a:t>339 Failure data points (3.39%)</a:t>
+            </a:r>
+            <a:endParaRPr>
+              <a:solidFill>
+                <a:schemeClr val="dk1"/>
+              </a:solidFill>
+              <a:latin typeface="Roboto"/>
+              <a:ea typeface="Roboto"/>
+              <a:cs typeface="Roboto"/>
+              <a:sym typeface="Roboto"/>
+            </a:endParaRPr>
+          </a:p>
+          <a:p>
+            <a:pPr indent="0" lvl="0" marL="0" rtl="0" algn="l">
+              <a:spcBef>
+                <a:spcPts val="0"/>
+              </a:spcBef>
+              <a:spcAft>
+                <a:spcPts val="0"/>
+              </a:spcAft>
+              <a:buNone/>
+            </a:pPr>
+            <a:r>
+              <a:t/>
+            </a:r>
+            <a:endParaRPr>
+              <a:solidFill>
+                <a:schemeClr val="dk1"/>
+              </a:solidFill>
+              <a:latin typeface="Roboto"/>
+              <a:ea typeface="Roboto"/>
+              <a:cs typeface="Roboto"/>
+              <a:sym typeface="Roboto"/>
+            </a:endParaRPr>
+          </a:p>
           <a:p>
             <a:pPr indent="0" lvl="0" marL="0" rtl="0" algn="l">
               <a:spcBef>
@@ -8572,6 +9247,34 @@
           </a:p>
         </p:txBody>
       </p:sp>
+      <p:pic>
+        <p:nvPicPr>
+          <p:cNvPr id="89" name="Google Shape;89;p17"/>
+          <p:cNvPicPr preferRelativeResize="0"/>
+          <p:nvPr/>
+        </p:nvPicPr>
+        <p:blipFill>
+          <a:blip r:embed="rId3">
+            <a:alphaModFix/>
+          </a:blip>
+          <a:stretch>
+            <a:fillRect/>
+          </a:stretch>
+        </p:blipFill>
+        <p:spPr>
+          <a:xfrm>
+            <a:off x="265275" y="623175"/>
+            <a:ext cx="4901821" cy="4231651"/>
+          </a:xfrm>
+          <a:prstGeom prst="rect">
+            <a:avLst/>
+          </a:prstGeom>
+          <a:noFill/>
+          <a:ln>
+            <a:noFill/>
+          </a:ln>
+        </p:spPr>
+      </p:pic>
     </p:spTree>
   </p:cSld>
   <p:clrMapOvr>
@@ -9471,49 +10174,9 @@
           <a:chExt cx="0" cy="0"/>
         </a:xfrm>
       </p:grpSpPr>
-      <p:sp>
-        <p:nvSpPr>
-          <p:cNvPr id="129" name="Google Shape;129;p21"/>
-          <p:cNvSpPr txBox="1"/>
-          <p:nvPr>
-            <p:ph type="title"/>
-          </p:nvPr>
-        </p:nvSpPr>
-        <p:spPr>
-          <a:xfrm>
-            <a:off x="645900" y="38425"/>
-            <a:ext cx="7852200" cy="731400"/>
-          </a:xfrm>
-          <a:prstGeom prst="rect">
-            <a:avLst/>
-          </a:prstGeom>
-        </p:spPr>
-        <p:txBody>
-          <a:bodyPr anchorCtr="0" anchor="ctr" bIns="91425" lIns="91425" spcFirstLastPara="1" rIns="91425" wrap="square" tIns="91425">
-            <a:noAutofit/>
-          </a:bodyPr>
-          <a:lstStyle/>
-          <a:p>
-            <a:pPr indent="0" lvl="0" marL="0" rtl="0" algn="ctr">
-              <a:spcBef>
-                <a:spcPts val="0"/>
-              </a:spcBef>
-              <a:spcAft>
-                <a:spcPts val="0"/>
-              </a:spcAft>
-              <a:buNone/>
-            </a:pPr>
-            <a:r>
-              <a:rPr lang="en"/>
-              <a:t>RESULTS</a:t>
-            </a:r>
-            <a:endParaRPr/>
-          </a:p>
-        </p:txBody>
-      </p:sp>
       <p:pic>
         <p:nvPicPr>
-          <p:cNvPr id="130" name="Google Shape;130;p21"/>
+          <p:cNvPr id="129" name="Google Shape;129;p21"/>
           <p:cNvPicPr preferRelativeResize="0"/>
           <p:nvPr/>
         </p:nvPicPr>
@@ -9527,8 +10190,8 @@
         </p:blipFill>
         <p:spPr>
           <a:xfrm>
-            <a:off x="107250" y="769825"/>
-            <a:ext cx="5969239" cy="4068876"/>
+            <a:off x="159825" y="118775"/>
+            <a:ext cx="3829161" cy="2428113"/>
           </a:xfrm>
           <a:prstGeom prst="rect">
             <a:avLst/>
@@ -9541,14 +10204,54 @@
       </p:pic>
       <p:sp>
         <p:nvSpPr>
+          <p:cNvPr id="130" name="Google Shape;130;p21"/>
+          <p:cNvSpPr txBox="1"/>
+          <p:nvPr>
+            <p:ph type="title"/>
+          </p:nvPr>
+        </p:nvSpPr>
+        <p:spPr>
+          <a:xfrm>
+            <a:off x="645900" y="4471750"/>
+            <a:ext cx="7852200" cy="731400"/>
+          </a:xfrm>
+          <a:prstGeom prst="rect">
+            <a:avLst/>
+          </a:prstGeom>
+        </p:spPr>
+        <p:txBody>
+          <a:bodyPr anchorCtr="0" anchor="ctr" bIns="91425" lIns="91425" spcFirstLastPara="1" rIns="91425" wrap="square" tIns="91425">
+            <a:noAutofit/>
+          </a:bodyPr>
+          <a:lstStyle/>
+          <a:p>
+            <a:pPr indent="0" lvl="0" marL="0" rtl="0" algn="ctr">
+              <a:spcBef>
+                <a:spcPts val="0"/>
+              </a:spcBef>
+              <a:spcAft>
+                <a:spcPts val="0"/>
+              </a:spcAft>
+              <a:buNone/>
+            </a:pPr>
+            <a:r>
+              <a:rPr lang="en"/>
+              <a:t>RESULTS</a:t>
+            </a:r>
+            <a:endParaRPr/>
+          </a:p>
+        </p:txBody>
+      </p:sp>
+      <p:sp>
+        <p:nvSpPr>
           <p:cNvPr id="131" name="Google Shape;131;p21"/>
           <p:cNvSpPr txBox="1"/>
           <p:nvPr/>
         </p:nvSpPr>
         <p:spPr>
           <a:xfrm>
-            <a:off x="6246188" y="769825"/>
-            <a:ext cx="2708700" cy="1477500"/>
+            <a:off x="386650" y="3167863"/>
+            <a:ext cx="3409800" cy="615600"/>
           </a:xfrm>
           <a:prstGeom prst="rect">
             <a:avLst/>
@@ -9583,94 +10286,7 @@
                 <a:cs typeface="Roboto"/>
                 <a:sym typeface="Roboto"/>
               </a:rPr>
-              <a:t>Final Model has the most incorrect predictions in no failure</a:t>
-            </a:r>
-            <a:endParaRPr>
-              <a:solidFill>
-                <a:schemeClr val="dk1"/>
-              </a:solidFill>
-              <a:latin typeface="Roboto"/>
-              <a:ea typeface="Roboto"/>
-              <a:cs typeface="Roboto"/>
-              <a:sym typeface="Roboto"/>
-            </a:endParaRPr>
-          </a:p>
-          <a:p>
-            <a:pPr indent="0" lvl="0" marL="0" rtl="0" algn="l">
-              <a:spcBef>
-                <a:spcPts val="0"/>
-              </a:spcBef>
-              <a:spcAft>
-                <a:spcPts val="0"/>
-              </a:spcAft>
-              <a:buNone/>
-            </a:pPr>
-            <a:r>
-              <a:t/>
-            </a:r>
-            <a:endParaRPr>
-              <a:solidFill>
-                <a:schemeClr val="dk1"/>
-              </a:solidFill>
-              <a:latin typeface="Roboto"/>
-              <a:ea typeface="Roboto"/>
-              <a:cs typeface="Roboto"/>
-              <a:sym typeface="Roboto"/>
-            </a:endParaRPr>
-          </a:p>
-          <a:p>
-            <a:pPr indent="0" lvl="0" marL="0" rtl="0" algn="l">
-              <a:spcBef>
-                <a:spcPts val="0"/>
-              </a:spcBef>
-              <a:spcAft>
-                <a:spcPts val="0"/>
-              </a:spcAft>
-              <a:buNone/>
-            </a:pPr>
-            <a:r>
-              <a:rPr lang="en">
-                <a:solidFill>
-                  <a:schemeClr val="dk1"/>
-                </a:solidFill>
-                <a:latin typeface="Roboto"/>
-                <a:ea typeface="Roboto"/>
-                <a:cs typeface="Roboto"/>
-                <a:sym typeface="Roboto"/>
-              </a:rPr>
-              <a:t>98% Accuracy</a:t>
-            </a:r>
-            <a:endParaRPr>
-              <a:solidFill>
-                <a:schemeClr val="dk1"/>
-              </a:solidFill>
-              <a:latin typeface="Roboto"/>
-              <a:ea typeface="Roboto"/>
-              <a:cs typeface="Roboto"/>
-              <a:sym typeface="Roboto"/>
-            </a:endParaRPr>
-          </a:p>
-          <a:p>
-            <a:pPr indent="0" lvl="0" marL="0" rtl="0" algn="l">
-              <a:spcBef>
-                <a:spcPts val="0"/>
-              </a:spcBef>
-              <a:spcAft>
-                <a:spcPts val="0"/>
-              </a:spcAft>
-              <a:buNone/>
-            </a:pPr>
-            <a:r>
-              <a:rPr lang="en">
-                <a:solidFill>
-                  <a:schemeClr val="dk1"/>
-                </a:solidFill>
-                <a:latin typeface="Roboto"/>
-                <a:ea typeface="Roboto"/>
-                <a:cs typeface="Roboto"/>
-                <a:sym typeface="Roboto"/>
-              </a:rPr>
-              <a:t>82% Precision</a:t>
+              <a:t>Final Model has the most incorrect predictions in no failure at 9 out of 1995</a:t>
             </a:r>
             <a:endParaRPr>
               <a:solidFill>
@@ -9684,34 +10300,6 @@
           </a:p>
         </p:txBody>
       </p:sp>
-      <p:pic>
-        <p:nvPicPr>
-          <p:cNvPr id="132" name="Google Shape;132;p21"/>
-          <p:cNvPicPr preferRelativeResize="0"/>
-          <p:nvPr/>
-        </p:nvPicPr>
-        <p:blipFill>
-          <a:blip r:embed="rId4">
-            <a:alphaModFix/>
-          </a:blip>
-          <a:stretch>
-            <a:fillRect/>
-          </a:stretch>
-        </p:blipFill>
-        <p:spPr>
-          <a:xfrm>
-            <a:off x="107266" y="769825"/>
-            <a:ext cx="5969249" cy="4068918"/>
-          </a:xfrm>
-          <a:prstGeom prst="rect">
-            <a:avLst/>
-          </a:prstGeom>
-          <a:noFill/>
-          <a:ln>
-            <a:noFill/>
-          </a:ln>
-        </p:spPr>
-      </p:pic>
     </p:spTree>
   </p:cSld>
   <p:clrMapOvr>
@@ -9721,6 +10309,285 @@
 </file>
 
 <file path=ppt/theme/theme1.xml><?xml version="1.0" encoding="utf-8"?>
+<a:theme xmlns:a="http://schemas.openxmlformats.org/drawingml/2006/main" xmlns:r="http://schemas.openxmlformats.org/officeDocument/2006/relationships">
+  <a:themeElements>
+    <a:clrScheme name="Default">
+      <a:dk1>
+        <a:srgbClr val="000000"/>
+      </a:dk1>
+      <a:lt1>
+        <a:srgbClr val="FFFFFF"/>
+      </a:lt1>
+      <a:dk2>
+        <a:srgbClr val="158158"/>
+      </a:dk2>
+      <a:lt2>
+        <a:srgbClr val="F3F3F3"/>
+      </a:lt2>
+      <a:accent1>
+        <a:srgbClr val="058DC7"/>
+      </a:accent1>
+      <a:accent2>
+        <a:srgbClr val="50B432"/>
+      </a:accent2>
+      <a:accent3>
+        <a:srgbClr val="ED561B"/>
+      </a:accent3>
+      <a:accent4>
+        <a:srgbClr val="EDEF00"/>
+      </a:accent4>
+      <a:accent5>
+        <a:srgbClr val="24CBE5"/>
+      </a:accent5>
+      <a:accent6>
+        <a:srgbClr val="64E572"/>
+      </a:accent6>
+      <a:hlink>
+        <a:srgbClr val="2200CC"/>
+      </a:hlink>
+      <a:folHlink>
+        <a:srgbClr val="551A8B"/>
+      </a:folHlink>
+    </a:clrScheme>
+    <a:fontScheme name="Office">
+      <a:majorFont>
+        <a:latin typeface="Arial"/>
+        <a:ea typeface=""/>
+        <a:cs typeface=""/>
+        <a:font script="Jpan" typeface="ＭＳ Ｐゴシック"/>
+        <a:font script="Hang" typeface="맑은 고딕"/>
+        <a:font script="Hans" typeface="宋体"/>
+        <a:font script="Hant" typeface="新細明體"/>
+        <a:font script="Arab" typeface="Times New Roman"/>
+        <a:font script="Hebr" typeface="Times New Roman"/>
+        <a:font script="Thai" typeface="Angsana New"/>
+        <a:font script="Ethi" typeface="Nyala"/>
+        <a:font script="Beng" typeface="Vrinda"/>
+        <a:font script="Gujr" typeface="Shruti"/>
+        <a:font script="Khmr" typeface="MoolBoran"/>
+        <a:font script="Knda" typeface="Tunga"/>
+        <a:font script="Guru" typeface="Raavi"/>
+        <a:font script="Cans" typeface="Euphemia"/>
+        <a:font script="Cher" typeface="Plantagenet Cherokee"/>
+        <a:font script="Yiii" typeface="Microsoft Yi Baiti"/>
+        <a:font script="Tibt" typeface="Microsoft Himalaya"/>
+        <a:font script="Thaa" typeface="MV Boli"/>
+        <a:font script="Deva" typeface="Mangal"/>
+        <a:font script="Telu" typeface="Gautami"/>
+        <a:font script="Taml" typeface="Latha"/>
+        <a:font script="Syrc" typeface="Estrangelo Edessa"/>
+        <a:font script="Orya" typeface="Kalinga"/>
+        <a:font script="Mlym" typeface="Kartika"/>
+        <a:font script="Laoo" typeface="DokChampa"/>
+        <a:font script="Sinh" typeface="Iskoola Pota"/>
+        <a:font script="Mong" typeface="Mongolian Baiti"/>
+        <a:font script="Viet" typeface="Times New Roman"/>
+        <a:font script="Uigh" typeface="Microsoft Uighur"/>
+        <a:font script="Geor" typeface="Sylfaen"/>
+      </a:majorFont>
+      <a:minorFont>
+        <a:latin typeface="Arial"/>
+        <a:ea typeface=""/>
+        <a:cs typeface=""/>
+        <a:font script="Jpan" typeface="ＭＳ Ｐゴシック"/>
+        <a:font script="Hang" typeface="맑은 고딕"/>
+        <a:font script="Hans" typeface="宋体"/>
+        <a:font script="Hant" typeface="新細明體"/>
+        <a:font script="Arab" typeface="Arial"/>
+        <a:font script="Hebr" typeface="Arial"/>
+        <a:font script="Thai" typeface="Cordia New"/>
+        <a:font script="Ethi" typeface="Nyala"/>
+        <a:font script="Beng" typeface="Vrinda"/>
+        <a:font script="Gujr" typeface="Shruti"/>
+        <a:font script="Khmr" typeface="DaunPenh"/>
+        <a:font script="Knda" typeface="Tunga"/>
+        <a:font script="Guru" typeface="Raavi"/>
+        <a:font script="Cans" typeface="Euphemia"/>
+        <a:font script="Cher" typeface="Plantagenet Cherokee"/>
+        <a:font script="Yiii" typeface="Microsoft Yi Baiti"/>
+        <a:font script="Tibt" typeface="Microsoft Himalaya"/>
+        <a:font script="Thaa" typeface="MV Boli"/>
+        <a:font script="Deva" typeface="Mangal"/>
+        <a:font script="Telu" typeface="Gautami"/>
+        <a:font script="Taml" typeface="Latha"/>
+        <a:font script="Syrc" typeface="Estrangelo Edessa"/>
+        <a:font script="Orya" typeface="Kalinga"/>
+        <a:font script="Mlym" typeface="Kartika"/>
+        <a:font script="Laoo" typeface="DokChampa"/>
+        <a:font script="Sinh" typeface="Iskoola Pota"/>
+        <a:font script="Mong" typeface="Mongolian Baiti"/>
+        <a:font script="Viet" typeface="Arial"/>
+        <a:font script="Uigh" typeface="Microsoft Uighur"/>
+        <a:font script="Geor" typeface="Sylfaen"/>
+      </a:minorFont>
+    </a:fontScheme>
+    <a:fmtScheme name="Office">
+      <a:fillStyleLst>
+        <a:solidFill>
+          <a:schemeClr val="phClr"/>
+        </a:solidFill>
+        <a:gradFill rotWithShape="1">
+          <a:gsLst>
+            <a:gs pos="0">
+              <a:schemeClr val="phClr">
+                <a:tint val="50000"/>
+                <a:satMod val="300000"/>
+              </a:schemeClr>
+            </a:gs>
+            <a:gs pos="35000">
+              <a:schemeClr val="phClr">
+                <a:tint val="37000"/>
+                <a:satMod val="300000"/>
+              </a:schemeClr>
+            </a:gs>
+            <a:gs pos="100000">
+              <a:schemeClr val="phClr">
+                <a:tint val="15000"/>
+                <a:satMod val="350000"/>
+              </a:schemeClr>
+            </a:gs>
+          </a:gsLst>
+          <a:lin ang="16200000" scaled="1"/>
+        </a:gradFill>
+        <a:gradFill rotWithShape="1">
+          <a:gsLst>
+            <a:gs pos="0">
+              <a:schemeClr val="phClr">
+                <a:tint val="100000"/>
+                <a:shade val="100000"/>
+                <a:satMod val="130000"/>
+              </a:schemeClr>
+            </a:gs>
+            <a:gs pos="100000">
+              <a:schemeClr val="phClr">
+                <a:tint val="50000"/>
+                <a:shade val="100000"/>
+                <a:satMod val="350000"/>
+              </a:schemeClr>
+            </a:gs>
+          </a:gsLst>
+          <a:lin ang="16200000" scaled="0"/>
+        </a:gradFill>
+      </a:fillStyleLst>
+      <a:lnStyleLst>
+        <a:ln w="9525" cap="flat" cmpd="sng" algn="ctr">
+          <a:solidFill>
+            <a:schemeClr val="phClr">
+              <a:shade val="95000"/>
+              <a:satMod val="105000"/>
+            </a:schemeClr>
+          </a:solidFill>
+          <a:prstDash val="solid"/>
+        </a:ln>
+        <a:ln w="25400" cap="flat" cmpd="sng" algn="ctr">
+          <a:solidFill>
+            <a:schemeClr val="phClr"/>
+          </a:solidFill>
+          <a:prstDash val="solid"/>
+        </a:ln>
+        <a:ln w="38100" cap="flat" cmpd="sng" algn="ctr">
+          <a:solidFill>
+            <a:schemeClr val="phClr"/>
+          </a:solidFill>
+          <a:prstDash val="solid"/>
+        </a:ln>
+      </a:lnStyleLst>
+      <a:effectStyleLst>
+        <a:effectStyle>
+          <a:effectLst>
+            <a:outerShdw blurRad="40000" dist="20000" dir="5400000" rotWithShape="0">
+              <a:srgbClr val="000000">
+                <a:alpha val="38000"/>
+              </a:srgbClr>
+            </a:outerShdw>
+          </a:effectLst>
+        </a:effectStyle>
+        <a:effectStyle>
+          <a:effectLst>
+            <a:outerShdw blurRad="40000" dist="23000" dir="5400000" rotWithShape="0">
+              <a:srgbClr val="000000">
+                <a:alpha val="35000"/>
+              </a:srgbClr>
+            </a:outerShdw>
+          </a:effectLst>
+        </a:effectStyle>
+        <a:effectStyle>
+          <a:effectLst>
+            <a:outerShdw blurRad="40000" dist="23000" dir="5400000" rotWithShape="0">
+              <a:srgbClr val="000000">
+                <a:alpha val="35000"/>
+              </a:srgbClr>
+            </a:outerShdw>
+          </a:effectLst>
+          <a:scene3d>
+            <a:camera prst="orthographicFront">
+              <a:rot lat="0" lon="0" rev="0"/>
+            </a:camera>
+            <a:lightRig rig="threePt" dir="t">
+              <a:rot lat="0" lon="0" rev="1200000"/>
+            </a:lightRig>
+          </a:scene3d>
+          <a:sp3d>
+            <a:bevelT w="63500" h="25400"/>
+          </a:sp3d>
+        </a:effectStyle>
+      </a:effectStyleLst>
+      <a:bgFillStyleLst>
+        <a:solidFill>
+          <a:schemeClr val="phClr"/>
+        </a:solidFill>
+        <a:gradFill rotWithShape="1">
+          <a:gsLst>
+            <a:gs pos="0">
+              <a:schemeClr val="phClr">
+                <a:tint val="40000"/>
+                <a:satMod val="350000"/>
+              </a:schemeClr>
+            </a:gs>
+            <a:gs pos="40000">
+              <a:schemeClr val="phClr">
+                <a:tint val="45000"/>
+                <a:shade val="99000"/>
+                <a:satMod val="350000"/>
+              </a:schemeClr>
+            </a:gs>
+            <a:gs pos="100000">
+              <a:schemeClr val="phClr">
+                <a:shade val="20000"/>
+                <a:satMod val="255000"/>
+              </a:schemeClr>
+            </a:gs>
+          </a:gsLst>
+          <a:path path="circle">
+            <a:fillToRect l="50000" t="-80000" r="50000" b="180000"/>
+          </a:path>
+        </a:gradFill>
+        <a:gradFill rotWithShape="1">
+          <a:gsLst>
+            <a:gs pos="0">
+              <a:schemeClr val="phClr">
+                <a:tint val="80000"/>
+                <a:satMod val="300000"/>
+              </a:schemeClr>
+            </a:gs>
+            <a:gs pos="100000">
+              <a:schemeClr val="phClr">
+                <a:shade val="30000"/>
+                <a:satMod val="200000"/>
+              </a:schemeClr>
+            </a:gs>
+          </a:gsLst>
+          <a:path path="circle">
+            <a:fillToRect l="50000" t="50000" r="50000" b="50000"/>
+          </a:path>
+        </a:gradFill>
+      </a:bgFillStyleLst>
+    </a:fmtScheme>
+  </a:themeElements>
+</a:theme>
+</file>
+
+<file path=ppt/theme/theme2.xml><?xml version="1.0" encoding="utf-8"?>
 <a:theme xmlns:a="http://schemas.openxmlformats.org/drawingml/2006/main" xmlns:r="http://schemas.openxmlformats.org/officeDocument/2006/relationships" name="Slate">
   <a:themeElements>
     <a:clrScheme name="Slate">
@@ -9997,283 +10864,4 @@
     </a:fmtScheme>
   </a:themeElements>
 </a:theme>
-</file>
-
-<file path=ppt/theme/theme2.xml><?xml version="1.0" encoding="utf-8"?>
-<a:theme xmlns:a="http://schemas.openxmlformats.org/drawingml/2006/main" xmlns:r="http://schemas.openxmlformats.org/officeDocument/2006/relationships">
-  <a:themeElements>
-    <a:clrScheme name="Default">
-      <a:dk1>
-        <a:srgbClr val="000000"/>
-      </a:dk1>
-      <a:lt1>
-        <a:srgbClr val="FFFFFF"/>
-      </a:lt1>
-      <a:dk2>
-        <a:srgbClr val="158158"/>
-      </a:dk2>
-      <a:lt2>
-        <a:srgbClr val="F3F3F3"/>
-      </a:lt2>
-      <a:accent1>
-        <a:srgbClr val="058DC7"/>
-      </a:accent1>
-      <a:accent2>
-        <a:srgbClr val="50B432"/>
-      </a:accent2>
-      <a:accent3>
-        <a:srgbClr val="ED561B"/>
-      </a:accent3>
-      <a:accent4>
-        <a:srgbClr val="EDEF00"/>
-      </a:accent4>
-      <a:accent5>
-        <a:srgbClr val="24CBE5"/>
-      </a:accent5>
-      <a:accent6>
-        <a:srgbClr val="64E572"/>
-      </a:accent6>
-      <a:hlink>
-        <a:srgbClr val="2200CC"/>
-      </a:hlink>
-      <a:folHlink>
-        <a:srgbClr val="551A8B"/>
-      </a:folHlink>
-    </a:clrScheme>
-    <a:fontScheme name="Office">
-      <a:majorFont>
-        <a:latin typeface="Arial"/>
-        <a:ea typeface=""/>
-        <a:cs typeface=""/>
-        <a:font script="Jpan" typeface="ＭＳ Ｐゴシック"/>
-        <a:font script="Hang" typeface="맑은 고딕"/>
-        <a:font script="Hans" typeface="宋体"/>
-        <a:font script="Hant" typeface="新細明體"/>
-        <a:font script="Arab" typeface="Times New Roman"/>
-        <a:font script="Hebr" typeface="Times New Roman"/>
-        <a:font script="Thai" typeface="Angsana New"/>
-        <a:font script="Ethi" typeface="Nyala"/>
-        <a:font script="Beng" typeface="Vrinda"/>
-        <a:font script="Gujr" typeface="Shruti"/>
-        <a:font script="Khmr" typeface="MoolBoran"/>
-        <a:font script="Knda" typeface="Tunga"/>
-        <a:font script="Guru" typeface="Raavi"/>
-        <a:font script="Cans" typeface="Euphemia"/>
-        <a:font script="Cher" typeface="Plantagenet Cherokee"/>
-        <a:font script="Yiii" typeface="Microsoft Yi Baiti"/>
-        <a:font script="Tibt" typeface="Microsoft Himalaya"/>
-        <a:font script="Thaa" typeface="MV Boli"/>
-        <a:font script="Deva" typeface="Mangal"/>
-        <a:font script="Telu" typeface="Gautami"/>
-        <a:font script="Taml" typeface="Latha"/>
-        <a:font script="Syrc" typeface="Estrangelo Edessa"/>
-        <a:font script="Orya" typeface="Kalinga"/>
-        <a:font script="Mlym" typeface="Kartika"/>
-        <a:font script="Laoo" typeface="DokChampa"/>
-        <a:font script="Sinh" typeface="Iskoola Pota"/>
-        <a:font script="Mong" typeface="Mongolian Baiti"/>
-        <a:font script="Viet" typeface="Times New Roman"/>
-        <a:font script="Uigh" typeface="Microsoft Uighur"/>
-        <a:font script="Geor" typeface="Sylfaen"/>
-      </a:majorFont>
-      <a:minorFont>
-        <a:latin typeface="Arial"/>
-        <a:ea typeface=""/>
-        <a:cs typeface=""/>
-        <a:font script="Jpan" typeface="ＭＳ Ｐゴシック"/>
-        <a:font script="Hang" typeface="맑은 고딕"/>
-        <a:font script="Hans" typeface="宋体"/>
-        <a:font script="Hant" typeface="新細明體"/>
-        <a:font script="Arab" typeface="Arial"/>
-        <a:font script="Hebr" typeface="Arial"/>
-        <a:font script="Thai" typeface="Cordia New"/>
-        <a:font script="Ethi" typeface="Nyala"/>
-        <a:font script="Beng" typeface="Vrinda"/>
-        <a:font script="Gujr" typeface="Shruti"/>
-        <a:font script="Khmr" typeface="DaunPenh"/>
-        <a:font script="Knda" typeface="Tunga"/>
-        <a:font script="Guru" typeface="Raavi"/>
-        <a:font script="Cans" typeface="Euphemia"/>
-        <a:font script="Cher" typeface="Plantagenet Cherokee"/>
-        <a:font script="Yiii" typeface="Microsoft Yi Baiti"/>
-        <a:font script="Tibt" typeface="Microsoft Himalaya"/>
-        <a:font script="Thaa" typeface="MV Boli"/>
-        <a:font script="Deva" typeface="Mangal"/>
-        <a:font script="Telu" typeface="Gautami"/>
-        <a:font script="Taml" typeface="Latha"/>
-        <a:font script="Syrc" typeface="Estrangelo Edessa"/>
-        <a:font script="Orya" typeface="Kalinga"/>
-        <a:font script="Mlym" typeface="Kartika"/>
-        <a:font script="Laoo" typeface="DokChampa"/>
-        <a:font script="Sinh" typeface="Iskoola Pota"/>
-        <a:font script="Mong" typeface="Mongolian Baiti"/>
-        <a:font script="Viet" typeface="Arial"/>
-        <a:font script="Uigh" typeface="Microsoft Uighur"/>
-        <a:font script="Geor" typeface="Sylfaen"/>
-      </a:minorFont>
-    </a:fontScheme>
-    <a:fmtScheme name="Office">
-      <a:fillStyleLst>
-        <a:solidFill>
-          <a:schemeClr val="phClr"/>
-        </a:solidFill>
-        <a:gradFill rotWithShape="1">
-          <a:gsLst>
-            <a:gs pos="0">
-              <a:schemeClr val="phClr">
-                <a:tint val="50000"/>
-                <a:satMod val="300000"/>
-              </a:schemeClr>
-            </a:gs>
-            <a:gs pos="35000">
-              <a:schemeClr val="phClr">
-                <a:tint val="37000"/>
-                <a:satMod val="300000"/>
-              </a:schemeClr>
-            </a:gs>
-            <a:gs pos="100000">
-              <a:schemeClr val="phClr">
-                <a:tint val="15000"/>
-                <a:satMod val="350000"/>
-              </a:schemeClr>
-            </a:gs>
-          </a:gsLst>
-          <a:lin ang="16200000" scaled="1"/>
-        </a:gradFill>
-        <a:gradFill rotWithShape="1">
-          <a:gsLst>
-            <a:gs pos="0">
-              <a:schemeClr val="phClr">
-                <a:tint val="100000"/>
-                <a:shade val="100000"/>
-                <a:satMod val="130000"/>
-              </a:schemeClr>
-            </a:gs>
-            <a:gs pos="100000">
-              <a:schemeClr val="phClr">
-                <a:tint val="50000"/>
-                <a:shade val="100000"/>
-                <a:satMod val="350000"/>
-              </a:schemeClr>
-            </a:gs>
-          </a:gsLst>
-          <a:lin ang="16200000" scaled="0"/>
-        </a:gradFill>
-      </a:fillStyleLst>
-      <a:lnStyleLst>
-        <a:ln w="9525" cap="flat" cmpd="sng" algn="ctr">
-          <a:solidFill>
-            <a:schemeClr val="phClr">
-              <a:shade val="95000"/>
-              <a:satMod val="105000"/>
-            </a:schemeClr>
-          </a:solidFill>
-          <a:prstDash val="solid"/>
-        </a:ln>
-        <a:ln w="25400" cap="flat" cmpd="sng" algn="ctr">
-          <a:solidFill>
-            <a:schemeClr val="phClr"/>
-          </a:solidFill>
-          <a:prstDash val="solid"/>
-        </a:ln>
-        <a:ln w="38100" cap="flat" cmpd="sng" algn="ctr">
-          <a:solidFill>
-            <a:schemeClr val="phClr"/>
-          </a:solidFill>
-          <a:prstDash val="solid"/>
-        </a:ln>
-      </a:lnStyleLst>
-      <a:effectStyleLst>
-        <a:effectStyle>
-          <a:effectLst>
-            <a:outerShdw blurRad="40000" dist="20000" dir="5400000" rotWithShape="0">
-              <a:srgbClr val="000000">
-                <a:alpha val="38000"/>
-              </a:srgbClr>
-            </a:outerShdw>
-          </a:effectLst>
-        </a:effectStyle>
-        <a:effectStyle>
-          <a:effectLst>
-            <a:outerShdw blurRad="40000" dist="23000" dir="5400000" rotWithShape="0">
-              <a:srgbClr val="000000">
-                <a:alpha val="35000"/>
-              </a:srgbClr>
-            </a:outerShdw>
-          </a:effectLst>
-        </a:effectStyle>
-        <a:effectStyle>
-          <a:effectLst>
-            <a:outerShdw blurRad="40000" dist="23000" dir="5400000" rotWithShape="0">
-              <a:srgbClr val="000000">
-                <a:alpha val="35000"/>
-              </a:srgbClr>
-            </a:outerShdw>
-          </a:effectLst>
-          <a:scene3d>
-            <a:camera prst="orthographicFront">
-              <a:rot lat="0" lon="0" rev="0"/>
-            </a:camera>
-            <a:lightRig rig="threePt" dir="t">
-              <a:rot lat="0" lon="0" rev="1200000"/>
-            </a:lightRig>
-          </a:scene3d>
-          <a:sp3d>
-            <a:bevelT w="63500" h="25400"/>
-          </a:sp3d>
-        </a:effectStyle>
-      </a:effectStyleLst>
-      <a:bgFillStyleLst>
-        <a:solidFill>
-          <a:schemeClr val="phClr"/>
-        </a:solidFill>
-        <a:gradFill rotWithShape="1">
-          <a:gsLst>
-            <a:gs pos="0">
-              <a:schemeClr val="phClr">
-                <a:tint val="40000"/>
-                <a:satMod val="350000"/>
-              </a:schemeClr>
-            </a:gs>
-            <a:gs pos="40000">
-              <a:schemeClr val="phClr">
-                <a:tint val="45000"/>
-                <a:shade val="99000"/>
-                <a:satMod val="350000"/>
-              </a:schemeClr>
-            </a:gs>
-            <a:gs pos="100000">
-              <a:schemeClr val="phClr">
-                <a:shade val="20000"/>
-                <a:satMod val="255000"/>
-              </a:schemeClr>
-            </a:gs>
-          </a:gsLst>
-          <a:path path="circle">
-            <a:fillToRect l="50000" t="-80000" r="50000" b="180000"/>
-          </a:path>
-        </a:gradFill>
-        <a:gradFill rotWithShape="1">
-          <a:gsLst>
-            <a:gs pos="0">
-              <a:schemeClr val="phClr">
-                <a:tint val="80000"/>
-                <a:satMod val="300000"/>
-              </a:schemeClr>
-            </a:gs>
-            <a:gs pos="100000">
-              <a:schemeClr val="phClr">
-                <a:shade val="30000"/>
-                <a:satMod val="200000"/>
-              </a:schemeClr>
-            </a:gs>
-          </a:gsLst>
-          <a:path path="circle">
-            <a:fillToRect l="50000" t="50000" r="50000" b="50000"/>
-          </a:path>
-        </a:gradFill>
-      </a:bgFillStyleLst>
-    </a:fmtScheme>
-  </a:themeElements>
-</a:theme>
 </file>
</xml_diff>